<commit_message>
Gateway term in figure
</commit_message>
<xml_diff>
--- a/images/wot-architecture-figures.pptx
+++ b/images/wot-architecture-figures.pptx
@@ -211,7 +211,7 @@
             <a:fld id="{8A111003-A0D2-4FD8-BEA6-5AFF75166CFE}" type="datetimeFigureOut">
               <a:rPr lang="de-DE" smtClean="0"/>
               <a:pPr/>
-              <a:t>24.08.2017</a:t>
+              <a:t>04.09.2017</a:t>
             </a:fld>
             <a:endParaRPr lang="de-DE"/>
           </a:p>
@@ -1789,7 +1789,7 @@
             <a:fld id="{1A337C23-E3EE-4DE1-9498-0ACEDE885A4A}" type="datetimeFigureOut">
               <a:rPr lang="de-DE" smtClean="0"/>
               <a:pPr/>
-              <a:t>24.08.2017</a:t>
+              <a:t>04.09.2017</a:t>
             </a:fld>
             <a:endParaRPr lang="de-DE"/>
           </a:p>
@@ -1956,7 +1956,7 @@
             <a:fld id="{1A337C23-E3EE-4DE1-9498-0ACEDE885A4A}" type="datetimeFigureOut">
               <a:rPr lang="de-DE" smtClean="0"/>
               <a:pPr/>
-              <a:t>24.08.2017</a:t>
+              <a:t>04.09.2017</a:t>
             </a:fld>
             <a:endParaRPr lang="de-DE"/>
           </a:p>
@@ -2133,7 +2133,7 @@
             <a:fld id="{1A337C23-E3EE-4DE1-9498-0ACEDE885A4A}" type="datetimeFigureOut">
               <a:rPr lang="de-DE" smtClean="0"/>
               <a:pPr/>
-              <a:t>24.08.2017</a:t>
+              <a:t>04.09.2017</a:t>
             </a:fld>
             <a:endParaRPr lang="de-DE"/>
           </a:p>
@@ -2300,7 +2300,7 @@
             <a:fld id="{1A337C23-E3EE-4DE1-9498-0ACEDE885A4A}" type="datetimeFigureOut">
               <a:rPr lang="de-DE" smtClean="0"/>
               <a:pPr/>
-              <a:t>24.08.2017</a:t>
+              <a:t>04.09.2017</a:t>
             </a:fld>
             <a:endParaRPr lang="de-DE"/>
           </a:p>
@@ -2543,7 +2543,7 @@
             <a:fld id="{1A337C23-E3EE-4DE1-9498-0ACEDE885A4A}" type="datetimeFigureOut">
               <a:rPr lang="de-DE" smtClean="0"/>
               <a:pPr/>
-              <a:t>24.08.2017</a:t>
+              <a:t>04.09.2017</a:t>
             </a:fld>
             <a:endParaRPr lang="de-DE"/>
           </a:p>
@@ -2828,7 +2828,7 @@
             <a:fld id="{1A337C23-E3EE-4DE1-9498-0ACEDE885A4A}" type="datetimeFigureOut">
               <a:rPr lang="de-DE" smtClean="0"/>
               <a:pPr/>
-              <a:t>24.08.2017</a:t>
+              <a:t>04.09.2017</a:t>
             </a:fld>
             <a:endParaRPr lang="de-DE"/>
           </a:p>
@@ -3247,7 +3247,7 @@
             <a:fld id="{1A337C23-E3EE-4DE1-9498-0ACEDE885A4A}" type="datetimeFigureOut">
               <a:rPr lang="de-DE" smtClean="0"/>
               <a:pPr/>
-              <a:t>24.08.2017</a:t>
+              <a:t>04.09.2017</a:t>
             </a:fld>
             <a:endParaRPr lang="de-DE"/>
           </a:p>
@@ -3362,7 +3362,7 @@
             <a:fld id="{1A337C23-E3EE-4DE1-9498-0ACEDE885A4A}" type="datetimeFigureOut">
               <a:rPr lang="de-DE" smtClean="0"/>
               <a:pPr/>
-              <a:t>24.08.2017</a:t>
+              <a:t>04.09.2017</a:t>
             </a:fld>
             <a:endParaRPr lang="de-DE"/>
           </a:p>
@@ -3454,7 +3454,7 @@
             <a:fld id="{1A337C23-E3EE-4DE1-9498-0ACEDE885A4A}" type="datetimeFigureOut">
               <a:rPr lang="de-DE" smtClean="0"/>
               <a:pPr/>
-              <a:t>24.08.2017</a:t>
+              <a:t>04.09.2017</a:t>
             </a:fld>
             <a:endParaRPr lang="de-DE"/>
           </a:p>
@@ -3728,7 +3728,7 @@
             <a:fld id="{1A337C23-E3EE-4DE1-9498-0ACEDE885A4A}" type="datetimeFigureOut">
               <a:rPr lang="de-DE" smtClean="0"/>
               <a:pPr/>
-              <a:t>24.08.2017</a:t>
+              <a:t>04.09.2017</a:t>
             </a:fld>
             <a:endParaRPr lang="de-DE"/>
           </a:p>
@@ -3978,7 +3978,7 @@
             <a:fld id="{1A337C23-E3EE-4DE1-9498-0ACEDE885A4A}" type="datetimeFigureOut">
               <a:rPr lang="de-DE" smtClean="0"/>
               <a:pPr/>
-              <a:t>24.08.2017</a:t>
+              <a:t>04.09.2017</a:t>
             </a:fld>
             <a:endParaRPr lang="de-DE"/>
           </a:p>
@@ -4188,7 +4188,7 @@
             <a:fld id="{1A337C23-E3EE-4DE1-9498-0ACEDE885A4A}" type="datetimeFigureOut">
               <a:rPr lang="de-DE" smtClean="0"/>
               <a:pPr/>
-              <a:t>24.08.2017</a:t>
+              <a:t>04.09.2017</a:t>
             </a:fld>
             <a:endParaRPr lang="de-DE"/>
           </a:p>
@@ -5842,20 +5842,6 @@
               </a:rPr>
               <a:t>Servient</a:t>
             </a:r>
-            <a:endParaRPr kumimoji="0" lang="en-US" altLang="ja-JP" sz="1000" b="1" i="0" u="none" strike="noStrike" kern="0" cap="none" spc="0" normalizeH="0" baseline="0" dirty="0" smtClean="0">
-              <a:ln>
-                <a:noFill/>
-              </a:ln>
-              <a:solidFill>
-                <a:srgbClr val="000000"/>
-              </a:solidFill>
-              <a:effectLst/>
-              <a:uLnTx/>
-              <a:uFillTx/>
-              <a:latin typeface="Arial" pitchFamily="34" charset="0"/>
-              <a:ea typeface="HG明朝E" panose="02020909000000000000" pitchFamily="17" charset="-128"/>
-              <a:cs typeface="Arial" pitchFamily="34" charset="0"/>
-            </a:endParaRPr>
           </a:p>
         </p:txBody>
       </p:sp>
@@ -6393,7 +6379,7 @@
           <a:blip r:embed="rId3" cstate="print">
             <a:extLst>
               <a:ext uri="{28A0092B-C50C-407E-A947-70E740481C1C}">
-                <a14:useLocalDpi xmlns="" xmlns:a14="http://schemas.microsoft.com/office/drawing/2010/main" val="0"/>
+                <a14:useLocalDpi xmlns:a14="http://schemas.microsoft.com/office/drawing/2010/main" xmlns="" val="0"/>
               </a:ext>
             </a:extLst>
           </a:blip>
@@ -6541,7 +6527,7 @@
           </p:nvSpPr>
           <p:spPr>
             <a:xfrm>
-              <a:off x="6373284" y="1758913"/>
+              <a:off x="6373284" y="1740059"/>
               <a:ext cx="1089203" cy="338554"/>
             </a:xfrm>
             <a:prstGeom prst="rect">
@@ -6557,10 +6543,10 @@
             <a:p>
               <a:pPr algn="ctr"/>
               <a:r>
-                <a:rPr lang="en-US" sz="1600" b="1" smtClean="0"/>
-                <a:t>Edge Hubs</a:t>
+                <a:rPr lang="en-US" sz="1600" b="1" dirty="0" smtClean="0"/>
+                <a:t>Gateway</a:t>
               </a:r>
-              <a:endParaRPr lang="en-US" sz="1600" b="1"/>
+              <a:endParaRPr lang="en-US" sz="1600" b="1" dirty="0"/>
             </a:p>
           </p:txBody>
         </p:sp>
@@ -8008,7 +7994,7 @@
             <a:effectLst/>
             <a:extLst>
               <a:ext uri="{AF507438-7753-43E0-B8FC-AC1667EBCBE1}">
-                <a14:hiddenEffects xmlns="" xmlns:a14="http://schemas.microsoft.com/office/drawing/2010/main">
+                <a14:hiddenEffects xmlns:a14="http://schemas.microsoft.com/office/drawing/2010/main" xmlns="">
                   <a:effectLst>
                     <a:outerShdw blurRad="63500" dist="35921" dir="2700000" algn="ctr" rotWithShape="0">
                       <a:schemeClr val="bg2"/>
@@ -8051,7 +8037,7 @@
             <a:effectLst/>
             <a:extLst>
               <a:ext uri="{AF507438-7753-43E0-B8FC-AC1667EBCBE1}">
-                <a14:hiddenEffects xmlns="" xmlns:a14="http://schemas.microsoft.com/office/drawing/2010/main">
+                <a14:hiddenEffects xmlns:a14="http://schemas.microsoft.com/office/drawing/2010/main" xmlns="">
                   <a:effectLst>
                     <a:outerShdw blurRad="63500" dist="35921" dir="2700000" algn="ctr" rotWithShape="0">
                       <a:schemeClr val="bg2"/>
@@ -8074,7 +8060,7 @@
             <a:blip r:embed="rId4" cstate="print">
               <a:extLst>
                 <a:ext uri="{28A0092B-C50C-407E-A947-70E740481C1C}">
-                  <a14:useLocalDpi xmlns="" xmlns:a14="http://schemas.microsoft.com/office/drawing/2010/main" val="0"/>
+                  <a14:useLocalDpi xmlns:a14="http://schemas.microsoft.com/office/drawing/2010/main" xmlns="" val="0"/>
                 </a:ext>
               </a:extLst>
             </a:blip>
@@ -8084,7 +8070,7 @@
           </p:blipFill>
           <p:spPr>
             <a:xfrm>
-              <a:off x="6302472" y="2074895"/>
+              <a:off x="6302472" y="2056041"/>
               <a:ext cx="1193968" cy="477587"/>
             </a:xfrm>
             <a:prstGeom prst="rect">
@@ -9386,7 +9372,7 @@
               <a:defRPr/>
             </a:pPr>
             <a:r>
-              <a:rPr kumimoji="0" lang="en-US" altLang="ja-JP" sz="800" b="0" i="0" u="none" strike="noStrike" kern="0" cap="none" spc="0" normalizeH="0" baseline="0" smtClean="0">
+              <a:rPr kumimoji="0" lang="en-US" altLang="ja-JP" sz="800" b="0" i="0" u="none" strike="noStrike" kern="0" cap="none" spc="0" normalizeH="0" baseline="0" dirty="0" smtClean="0">
                 <a:ln>
                   <a:noFill/>
                 </a:ln>
@@ -9400,9 +9386,9 @@
                 <a:ea typeface="HG明朝E" panose="02020909000000000000" pitchFamily="17" charset="-128"/>
                 <a:cs typeface="Arial" pitchFamily="34" charset="0"/>
               </a:rPr>
-              <a:t>Digital Twiin</a:t>
-            </a:r>
-            <a:endParaRPr kumimoji="0" lang="en-US" altLang="ja-JP" sz="800" b="0" i="0" u="none" strike="noStrike" kern="0" cap="none" spc="0" normalizeH="0" baseline="0">
+              <a:t>Proxy Thing</a:t>
+            </a:r>
+            <a:endParaRPr kumimoji="0" lang="en-US" altLang="ja-JP" sz="800" b="0" i="0" u="none" strike="noStrike" kern="0" cap="none" spc="0" normalizeH="0" baseline="0" dirty="0">
               <a:ln>
                 <a:noFill/>
               </a:ln>
@@ -9796,7 +9782,7 @@
           <a:effectLst/>
           <a:extLst>
             <a:ext uri="{AF507438-7753-43E0-B8FC-AC1667EBCBE1}">
-              <a14:hiddenEffects xmlns="" xmlns:a14="http://schemas.microsoft.com/office/drawing/2010/main">
+              <a14:hiddenEffects xmlns:a14="http://schemas.microsoft.com/office/drawing/2010/main" xmlns="">
                 <a:effectLst>
                   <a:outerShdw blurRad="63500" dist="35921" dir="2700000" algn="ctr" rotWithShape="0">
                     <a:schemeClr val="bg2"/>
@@ -9839,7 +9825,7 @@
           <a:effectLst/>
           <a:extLst>
             <a:ext uri="{AF507438-7753-43E0-B8FC-AC1667EBCBE1}">
-              <a14:hiddenEffects xmlns="" xmlns:a14="http://schemas.microsoft.com/office/drawing/2010/main">
+              <a14:hiddenEffects xmlns:a14="http://schemas.microsoft.com/office/drawing/2010/main" xmlns="">
                 <a:effectLst>
                   <a:outerShdw blurRad="63500" dist="35921" dir="2700000" algn="ctr" rotWithShape="0">
                     <a:schemeClr val="bg2"/>
@@ -9941,7 +9927,7 @@
           <a:blip r:embed="rId5" cstate="print">
             <a:extLst>
               <a:ext uri="{28A0092B-C50C-407E-A947-70E740481C1C}">
-                <a14:useLocalDpi xmlns="" xmlns:a14="http://schemas.microsoft.com/office/drawing/2010/main" val="0"/>
+                <a14:useLocalDpi xmlns:a14="http://schemas.microsoft.com/office/drawing/2010/main" xmlns="" val="0"/>
               </a:ext>
             </a:extLst>
           </a:blip>
@@ -9989,11 +9975,7 @@
           <a:p>
             <a:r>
               <a:rPr lang="en-US" sz="1600" b="1" dirty="0" smtClean="0"/>
-              <a:t>Web </a:t>
-            </a:r>
-            <a:r>
-              <a:rPr lang="en-US" sz="1600" b="1" dirty="0" smtClean="0"/>
-              <a:t>Integration</a:t>
+              <a:t>Web Integration</a:t>
             </a:r>
             <a:endParaRPr lang="en-US" sz="1600" b="1" dirty="0"/>
           </a:p>
@@ -10339,7 +10321,7 @@
           <a:blip r:embed="rId6" cstate="print">
             <a:extLst>
               <a:ext uri="{BEBA8EAE-BF5A-486C-A8C5-ECC9F3942E4B}">
-                <a14:imgProps xmlns:a14="http://schemas.microsoft.com/office/drawing/2010/main" xmlns:lc="http://schemas.openxmlformats.org/drawingml/2006/lockedCanvas" xmlns="">
+                <a14:imgProps xmlns="" xmlns:lc="http://schemas.openxmlformats.org/drawingml/2006/lockedCanvas" xmlns:a14="http://schemas.microsoft.com/office/drawing/2010/main">
                   <a14:imgLayer r:embed="rId7">
                     <a14:imgEffect>
                       <a14:backgroundRemoval t="10000" b="90000" l="10000" r="90000">
@@ -10385,7 +10367,7 @@
                 </a14:imgProps>
               </a:ext>
               <a:ext uri="{28A0092B-C50C-407E-A947-70E740481C1C}">
-                <a14:useLocalDpi xmlns:a14="http://schemas.microsoft.com/office/drawing/2010/main" xmlns:lc="http://schemas.openxmlformats.org/drawingml/2006/lockedCanvas" xmlns="" val="0"/>
+                <a14:useLocalDpi xmlns="" xmlns:lc="http://schemas.openxmlformats.org/drawingml/2006/lockedCanvas" xmlns:a14="http://schemas.microsoft.com/office/drawing/2010/main" val="0"/>
               </a:ext>
             </a:extLst>
           </a:blip>
@@ -10405,7 +10387,7 @@
           <a:noFill/>
           <a:extLst>
             <a:ext uri="{909E8E84-426E-40DD-AFC4-6F175D3DCCD1}">
-              <a14:hiddenFill xmlns:a14="http://schemas.microsoft.com/office/drawing/2010/main" xmlns:lc="http://schemas.openxmlformats.org/drawingml/2006/lockedCanvas" xmlns="">
+              <a14:hiddenFill xmlns="" xmlns:lc="http://schemas.openxmlformats.org/drawingml/2006/lockedCanvas" xmlns:a14="http://schemas.microsoft.com/office/drawing/2010/main">
                 <a:solidFill>
                   <a:srgbClr val="FFFFFF"/>
                 </a:solidFill>
@@ -11228,13 +11210,6 @@
               </a:rPr>
               <a:t>Servient (Smartphone)</a:t>
             </a:r>
-            <a:endParaRPr lang="en-US" altLang="ja-JP" sz="2000" b="1" kern="0" dirty="0" smtClean="0">
-              <a:solidFill>
-                <a:srgbClr val="000000"/>
-              </a:solidFill>
-              <a:ea typeface="HG明朝E" panose="02020909000000000000" pitchFamily="17" charset="-128"/>
-              <a:cs typeface="Arial" pitchFamily="34" charset="0"/>
-            </a:endParaRPr>
           </a:p>
         </p:txBody>
       </p:sp>
@@ -12906,17 +12881,7 @@
                 <a:ea typeface="HG明朝E" panose="02020909000000000000" pitchFamily="17" charset="-128"/>
                 <a:cs typeface="Arial" pitchFamily="34" charset="0"/>
               </a:rPr>
-              <a:t>Browser + </a:t>
-            </a:r>
-            <a:r>
-              <a:rPr lang="en-US" altLang="ja-JP" sz="2000" kern="0" dirty="0" smtClean="0">
-                <a:solidFill>
-                  <a:prstClr val="white"/>
-                </a:solidFill>
-                <a:ea typeface="HG明朝E" panose="02020909000000000000" pitchFamily="17" charset="-128"/>
-                <a:cs typeface="Arial" pitchFamily="34" charset="0"/>
-              </a:rPr>
-              <a:t>Library</a:t>
+              <a:t>Browser + Library</a:t>
             </a:r>
           </a:p>
         </p:txBody>
@@ -13673,17 +13638,7 @@
                 <a:ea typeface="HG明朝E" panose="02020909000000000000" pitchFamily="17" charset="-128"/>
                 <a:cs typeface="Arial" pitchFamily="34" charset="0"/>
               </a:rPr>
-              <a:t>Servient </a:t>
-            </a:r>
-            <a:r>
-              <a:rPr lang="en-US" altLang="ja-JP" sz="2000" b="1" kern="0" dirty="0" smtClean="0">
-                <a:solidFill>
-                  <a:srgbClr val="000000"/>
-                </a:solidFill>
-                <a:ea typeface="HG明朝E" panose="02020909000000000000" pitchFamily="17" charset="-128"/>
-                <a:cs typeface="Arial" pitchFamily="34" charset="0"/>
-              </a:rPr>
-              <a:t>(Edge Hub)</a:t>
+              <a:t>Servient (Edge Hub)</a:t>
             </a:r>
           </a:p>
         </p:txBody>
@@ -15027,7 +14982,7 @@
           <a:blip r:embed="rId3" cstate="print">
             <a:extLst>
               <a:ext uri="{28A0092B-C50C-407E-A947-70E740481C1C}">
-                <a14:useLocalDpi xmlns="" xmlns:a14="http://schemas.microsoft.com/office/drawing/2010/main" val="0"/>
+                <a14:useLocalDpi xmlns:a14="http://schemas.microsoft.com/office/drawing/2010/main" xmlns="" val="0"/>
               </a:ext>
             </a:extLst>
           </a:blip>
@@ -15775,17 +15730,7 @@
                 <a:ea typeface="HG明朝E" panose="02020909000000000000" pitchFamily="17" charset="-128"/>
                 <a:cs typeface="Arial" pitchFamily="34" charset="0"/>
               </a:rPr>
-              <a:t>Browser + </a:t>
-            </a:r>
-            <a:r>
-              <a:rPr lang="en-US" altLang="ja-JP" sz="2000" kern="0" dirty="0" smtClean="0">
-                <a:solidFill>
-                  <a:prstClr val="white"/>
-                </a:solidFill>
-                <a:ea typeface="HG明朝E" panose="02020909000000000000" pitchFamily="17" charset="-128"/>
-                <a:cs typeface="Arial" pitchFamily="34" charset="0"/>
-              </a:rPr>
-              <a:t>Library</a:t>
+              <a:t>Browser + Library</a:t>
             </a:r>
           </a:p>
         </p:txBody>
@@ -16322,20 +16267,6 @@
               </a:rPr>
               <a:t>(Cloud)</a:t>
             </a:r>
-            <a:endParaRPr kumimoji="0" lang="en-US" altLang="ja-JP" sz="2000" b="1" i="0" u="none" strike="noStrike" kern="0" cap="none" spc="0" normalizeH="0" baseline="0" dirty="0" smtClean="0">
-              <a:ln>
-                <a:noFill/>
-              </a:ln>
-              <a:solidFill>
-                <a:srgbClr val="000000"/>
-              </a:solidFill>
-              <a:effectLst/>
-              <a:uLnTx/>
-              <a:uFillTx/>
-              <a:latin typeface="+mj-lt"/>
-              <a:ea typeface="HG明朝E" panose="02020909000000000000" pitchFamily="17" charset="-128"/>
-              <a:cs typeface="Arial" pitchFamily="34" charset="0"/>
-            </a:endParaRPr>
           </a:p>
         </p:txBody>
       </p:sp>
@@ -16783,35 +16714,8 @@
                 <a:ea typeface="HG明朝E" panose="02020909000000000000" pitchFamily="17" charset="-128"/>
                 <a:cs typeface="Arial" pitchFamily="34" charset="0"/>
               </a:rPr>
-              <a:t>Servient </a:t>
-            </a:r>
-            <a:r>
-              <a:rPr lang="en-US" altLang="ja-JP" sz="2000" b="1" kern="0" dirty="0" smtClean="0">
-                <a:solidFill>
-                  <a:srgbClr val="000000"/>
-                </a:solidFill>
-                <a:ea typeface="HG明朝E" panose="02020909000000000000" pitchFamily="17" charset="-128"/>
-                <a:cs typeface="Arial" pitchFamily="34" charset="0"/>
-              </a:rPr>
-              <a:t>(Edge </a:t>
-            </a:r>
-            <a:r>
-              <a:rPr lang="en-US" altLang="ja-JP" sz="2000" b="1" kern="0" dirty="0" smtClean="0">
-                <a:solidFill>
-                  <a:srgbClr val="000000"/>
-                </a:solidFill>
-                <a:ea typeface="HG明朝E" panose="02020909000000000000" pitchFamily="17" charset="-128"/>
-                <a:cs typeface="Arial" pitchFamily="34" charset="0"/>
-              </a:rPr>
-              <a:t>Hub)</a:t>
-            </a:r>
-            <a:endParaRPr lang="en-US" altLang="ja-JP" sz="2000" b="1" kern="0" dirty="0" smtClean="0">
-              <a:solidFill>
-                <a:srgbClr val="000000"/>
-              </a:solidFill>
-              <a:ea typeface="HG明朝E" panose="02020909000000000000" pitchFamily="17" charset="-128"/>
-              <a:cs typeface="Arial" pitchFamily="34" charset="0"/>
-            </a:endParaRPr>
+              <a:t>Servient (Edge Hub)</a:t>
+            </a:r>
           </a:p>
         </p:txBody>
       </p:sp>
@@ -17758,7 +17662,7 @@
           <a:blip r:embed="rId3" cstate="print">
             <a:extLst>
               <a:ext uri="{28A0092B-C50C-407E-A947-70E740481C1C}">
-                <a14:useLocalDpi xmlns="" xmlns:a14="http://schemas.microsoft.com/office/drawing/2010/main" val="0"/>
+                <a14:useLocalDpi xmlns:a14="http://schemas.microsoft.com/office/drawing/2010/main" xmlns="" val="0"/>
               </a:ext>
             </a:extLst>
           </a:blip>
@@ -19906,17 +19810,7 @@
                 <a:ea typeface="HG明朝E" panose="02020909000000000000" pitchFamily="17" charset="-128"/>
                 <a:cs typeface="Arial" pitchFamily="34" charset="0"/>
               </a:rPr>
-              <a:t>Browser + </a:t>
-            </a:r>
-            <a:r>
-              <a:rPr lang="en-US" altLang="ja-JP" sz="2000" kern="0" dirty="0" smtClean="0">
-                <a:solidFill>
-                  <a:prstClr val="white"/>
-                </a:solidFill>
-                <a:ea typeface="HG明朝E" panose="02020909000000000000" pitchFamily="17" charset="-128"/>
-                <a:cs typeface="Arial" pitchFamily="34" charset="0"/>
-              </a:rPr>
-              <a:t>Library</a:t>
+              <a:t>Browser + Library</a:t>
             </a:r>
           </a:p>
         </p:txBody>
@@ -20434,35 +20328,8 @@
                 <a:ea typeface="HG明朝E" panose="02020909000000000000" pitchFamily="17" charset="-128"/>
                 <a:cs typeface="Arial" pitchFamily="34" charset="0"/>
               </a:rPr>
-              <a:t>Servient </a:t>
-            </a:r>
-            <a:r>
-              <a:rPr lang="en-US" altLang="ja-JP" sz="2000" b="1" kern="0" dirty="0" smtClean="0">
-                <a:solidFill>
-                  <a:srgbClr val="000000"/>
-                </a:solidFill>
-                <a:ea typeface="HG明朝E" panose="02020909000000000000" pitchFamily="17" charset="-128"/>
-                <a:cs typeface="Arial" pitchFamily="34" charset="0"/>
-              </a:rPr>
-              <a:t>(</a:t>
-            </a:r>
-            <a:r>
-              <a:rPr lang="en-US" altLang="ja-JP" sz="2000" b="1" kern="0" dirty="0" smtClean="0">
-                <a:solidFill>
-                  <a:srgbClr val="000000"/>
-                </a:solidFill>
-                <a:ea typeface="HG明朝E" panose="02020909000000000000" pitchFamily="17" charset="-128"/>
-                <a:cs typeface="Arial" pitchFamily="34" charset="0"/>
-              </a:rPr>
-              <a:t>Cloud)</a:t>
-            </a:r>
-            <a:endParaRPr lang="en-US" altLang="ja-JP" sz="2000" b="1" kern="0" dirty="0" smtClean="0">
-              <a:solidFill>
-                <a:srgbClr val="000000"/>
-              </a:solidFill>
-              <a:ea typeface="HG明朝E" panose="02020909000000000000" pitchFamily="17" charset="-128"/>
-              <a:cs typeface="Arial" pitchFamily="34" charset="0"/>
-            </a:endParaRPr>
+              <a:t>Servient (Cloud)</a:t>
+            </a:r>
           </a:p>
         </p:txBody>
       </p:sp>
@@ -21401,7 +21268,7 @@
           <a:blip r:embed="rId3" cstate="print">
             <a:extLst>
               <a:ext uri="{28A0092B-C50C-407E-A947-70E740481C1C}">
-                <a14:useLocalDpi xmlns="" xmlns:a14="http://schemas.microsoft.com/office/drawing/2010/main" val="0"/>
+                <a14:useLocalDpi xmlns:a14="http://schemas.microsoft.com/office/drawing/2010/main" xmlns="" val="0"/>
               </a:ext>
             </a:extLst>
           </a:blip>
@@ -22550,17 +22417,7 @@
                 <a:ea typeface="HG明朝E" panose="02020909000000000000" pitchFamily="17" charset="-128"/>
                 <a:cs typeface="Arial" pitchFamily="34" charset="0"/>
               </a:rPr>
-              <a:t>Browser + </a:t>
-            </a:r>
-            <a:r>
-              <a:rPr lang="en-US" altLang="ja-JP" sz="2000" kern="0" dirty="0" smtClean="0">
-                <a:solidFill>
-                  <a:prstClr val="white"/>
-                </a:solidFill>
-                <a:ea typeface="HG明朝E" panose="02020909000000000000" pitchFamily="17" charset="-128"/>
-                <a:cs typeface="Arial" pitchFamily="34" charset="0"/>
-              </a:rPr>
-              <a:t>Library</a:t>
+              <a:t>Browser + Library</a:t>
             </a:r>
           </a:p>
         </p:txBody>
@@ -30525,20 +30382,6 @@
               </a:rPr>
               <a:t>Thing</a:t>
             </a:r>
-            <a:endParaRPr kumimoji="0" lang="en-US" altLang="ja-JP" sz="2000" b="1" i="0" u="none" strike="noStrike" kern="0" cap="none" spc="0" normalizeH="0" baseline="0" dirty="0" smtClean="0">
-              <a:ln>
-                <a:noFill/>
-              </a:ln>
-              <a:solidFill>
-                <a:srgbClr val="000000"/>
-              </a:solidFill>
-              <a:effectLst/>
-              <a:uLnTx/>
-              <a:uFillTx/>
-              <a:latin typeface="+mj-lt"/>
-              <a:ea typeface="HG明朝E" panose="02020909000000000000" pitchFamily="17" charset="-128"/>
-              <a:cs typeface="Arial" pitchFamily="34" charset="0"/>
-            </a:endParaRPr>
           </a:p>
         </p:txBody>
       </p:sp>
@@ -31379,20 +31222,6 @@
               </a:rPr>
               <a:t>Thing</a:t>
             </a:r>
-            <a:endParaRPr kumimoji="0" lang="en-US" altLang="ja-JP" sz="1400" i="0" u="none" strike="noStrike" kern="0" cap="none" spc="0" normalizeH="0" baseline="0" dirty="0" smtClean="0">
-              <a:ln>
-                <a:noFill/>
-              </a:ln>
-              <a:solidFill>
-                <a:srgbClr val="000000"/>
-              </a:solidFill>
-              <a:effectLst/>
-              <a:uLnTx/>
-              <a:uFillTx/>
-              <a:latin typeface="+mj-lt"/>
-              <a:ea typeface="HG明朝E" panose="02020909000000000000" pitchFamily="17" charset="-128"/>
-              <a:cs typeface="Arial" pitchFamily="34" charset="0"/>
-            </a:endParaRPr>
           </a:p>
         </p:txBody>
       </p:sp>
@@ -31637,13 +31466,6 @@
               </a:rPr>
               <a:t>oneM2M</a:t>
             </a:r>
-            <a:endParaRPr lang="en-US" altLang="ja-JP" sz="1400" kern="0" dirty="0" smtClean="0">
-              <a:solidFill>
-                <a:srgbClr val="000000"/>
-              </a:solidFill>
-              <a:ea typeface="HG明朝E" panose="02020909000000000000" pitchFamily="17" charset="-128"/>
-              <a:cs typeface="Arial" pitchFamily="34" charset="0"/>
-            </a:endParaRPr>
           </a:p>
         </p:txBody>
       </p:sp>
@@ -31875,20 +31697,6 @@
               </a:rPr>
               <a:t>Servient</a:t>
             </a:r>
-            <a:endParaRPr kumimoji="0" lang="en-US" altLang="ja-JP" sz="2000" b="1" i="0" u="none" strike="noStrike" kern="0" cap="none" spc="0" normalizeH="0" baseline="0" dirty="0" smtClean="0">
-              <a:ln>
-                <a:noFill/>
-              </a:ln>
-              <a:solidFill>
-                <a:srgbClr val="000000"/>
-              </a:solidFill>
-              <a:effectLst/>
-              <a:uLnTx/>
-              <a:uFillTx/>
-              <a:latin typeface="+mj-lt"/>
-              <a:ea typeface="HG明朝E" panose="02020909000000000000" pitchFamily="17" charset="-128"/>
-              <a:cs typeface="Arial" pitchFamily="34" charset="0"/>
-            </a:endParaRPr>
           </a:p>
         </p:txBody>
       </p:sp>
@@ -32066,13 +31874,6 @@
               </a:rPr>
               <a:t>Thing</a:t>
             </a:r>
-            <a:endParaRPr lang="en-US" altLang="ja-JP" sz="1400" kern="0" dirty="0" smtClean="0">
-              <a:solidFill>
-                <a:srgbClr val="000000"/>
-              </a:solidFill>
-              <a:ea typeface="HG明朝E" panose="02020909000000000000" pitchFamily="17" charset="-128"/>
-              <a:cs typeface="Arial" pitchFamily="34" charset="0"/>
-            </a:endParaRPr>
           </a:p>
         </p:txBody>
       </p:sp>
@@ -34085,20 +33886,6 @@
               </a:rPr>
               <a:t>Web Browser Servient</a:t>
             </a:r>
-            <a:endParaRPr kumimoji="0" lang="en-US" altLang="ja-JP" sz="2000" b="1" i="0" u="none" strike="noStrike" kern="0" cap="none" spc="0" normalizeH="0" baseline="0" dirty="0" smtClean="0">
-              <a:ln>
-                <a:noFill/>
-              </a:ln>
-              <a:solidFill>
-                <a:srgbClr val="000000"/>
-              </a:solidFill>
-              <a:effectLst/>
-              <a:uLnTx/>
-              <a:uFillTx/>
-              <a:latin typeface="+mj-lt"/>
-              <a:ea typeface="HG明朝E" panose="02020909000000000000" pitchFamily="17" charset="-128"/>
-              <a:cs typeface="Arial" pitchFamily="34" charset="0"/>
-            </a:endParaRPr>
           </a:p>
         </p:txBody>
       </p:sp>
@@ -34286,13 +34073,6 @@
               </a:rPr>
               <a:t> Device</a:t>
             </a:r>
-            <a:endParaRPr lang="en-US" altLang="ja-JP" sz="1400" kern="0" dirty="0" smtClean="0">
-              <a:solidFill>
-                <a:srgbClr val="000000"/>
-              </a:solidFill>
-              <a:ea typeface="HG明朝E" panose="02020909000000000000" pitchFamily="17" charset="-128"/>
-              <a:cs typeface="Arial" pitchFamily="34" charset="0"/>
-            </a:endParaRPr>
           </a:p>
         </p:txBody>
       </p:sp>
@@ -34794,25 +34574,8 @@
                 <a:ea typeface="HG明朝E" panose="02020909000000000000" pitchFamily="17" charset="-128"/>
                 <a:cs typeface="Arial" pitchFamily="34" charset="0"/>
               </a:rPr>
-              <a:t>Browser Runtime + </a:t>
-            </a:r>
-            <a:r>
-              <a:rPr lang="en-US" altLang="ja-JP" sz="2000" kern="0" dirty="0" smtClean="0">
-                <a:solidFill>
-                  <a:prstClr val="white"/>
-                </a:solidFill>
-                <a:ea typeface="HG明朝E" panose="02020909000000000000" pitchFamily="17" charset="-128"/>
-                <a:cs typeface="Arial" pitchFamily="34" charset="0"/>
-              </a:rPr>
-              <a:t>WoT Library</a:t>
-            </a:r>
-            <a:endParaRPr lang="en-US" altLang="ja-JP" sz="2000" kern="0" dirty="0" smtClean="0">
-              <a:solidFill>
-                <a:prstClr val="white"/>
-              </a:solidFill>
-              <a:ea typeface="HG明朝E" panose="02020909000000000000" pitchFamily="17" charset="-128"/>
-              <a:cs typeface="Arial" pitchFamily="34" charset="0"/>
-            </a:endParaRPr>
+              <a:t>Browser Runtime + WoT Library</a:t>
+            </a:r>
           </a:p>
         </p:txBody>
       </p:sp>
@@ -35152,20 +34915,6 @@
               </a:rPr>
               <a:t>*-over-WSs Device</a:t>
             </a:r>
-            <a:endParaRPr kumimoji="0" lang="en-US" altLang="ja-JP" sz="1400" i="0" u="none" strike="noStrike" kern="0" cap="none" spc="0" normalizeH="0" baseline="0" dirty="0" smtClean="0">
-              <a:ln>
-                <a:noFill/>
-              </a:ln>
-              <a:solidFill>
-                <a:srgbClr val="000000"/>
-              </a:solidFill>
-              <a:effectLst/>
-              <a:uLnTx/>
-              <a:uFillTx/>
-              <a:latin typeface="+mj-lt"/>
-              <a:ea typeface="HG明朝E" panose="02020909000000000000" pitchFamily="17" charset="-128"/>
-              <a:cs typeface="Arial" pitchFamily="34" charset="0"/>
-            </a:endParaRPr>
           </a:p>
         </p:txBody>
       </p:sp>
@@ -35342,17 +35091,7 @@
                 <a:ea typeface="HG明朝E" panose="02020909000000000000" pitchFamily="17" charset="-128"/>
                 <a:cs typeface="Arial" pitchFamily="34" charset="0"/>
               </a:rPr>
-              <a:t>Web </a:t>
-            </a:r>
-            <a:r>
-              <a:rPr lang="en-US" altLang="ja-JP" sz="1400" kern="0" dirty="0" smtClean="0">
-                <a:solidFill>
-                  <a:srgbClr val="000000"/>
-                </a:solidFill>
-                <a:ea typeface="HG明朝E" panose="02020909000000000000" pitchFamily="17" charset="-128"/>
-                <a:cs typeface="Arial" pitchFamily="34" charset="0"/>
-              </a:rPr>
-              <a:t>Server</a:t>
+              <a:t>Web Server</a:t>
             </a:r>
             <a:endParaRPr lang="en-US" altLang="ja-JP" sz="1400" kern="0" dirty="0">
               <a:solidFill>
@@ -36403,47 +36142,7 @@
                   <a:schemeClr val="bg1"/>
                 </a:solidFill>
               </a:rPr>
-              <a:t>“IoT </a:t>
-            </a:r>
-            <a:r>
-              <a:rPr lang="en-US" sz="2000" dirty="0" smtClean="0">
-                <a:solidFill>
-                  <a:schemeClr val="bg1"/>
-                </a:solidFill>
-              </a:rPr>
-              <a:t>Platform” × “</a:t>
-            </a:r>
-            <a:r>
-              <a:rPr lang="en-US" sz="2000" dirty="0" smtClean="0">
-                <a:solidFill>
-                  <a:schemeClr val="bg1"/>
-                </a:solidFill>
-              </a:rPr>
-              <a:t>Transfer Protocol” </a:t>
-            </a:r>
-            <a:r>
-              <a:rPr lang="en-US" sz="2000" dirty="0" smtClean="0">
-                <a:solidFill>
-                  <a:schemeClr val="bg1"/>
-                </a:solidFill>
-              </a:rPr>
-              <a:t>× </a:t>
-            </a:r>
-            <a:r>
-              <a:rPr lang="en-US" sz="2000" dirty="0" smtClean="0">
-                <a:solidFill>
-                  <a:schemeClr val="bg1"/>
-                </a:solidFill>
-              </a:rPr>
-              <a:t>“</a:t>
-            </a:r>
-            <a:r>
-              <a:rPr lang="en-US" sz="2000" dirty="0" smtClean="0">
-                <a:solidFill>
-                  <a:schemeClr val="bg1"/>
-                </a:solidFill>
-              </a:rPr>
-              <a:t>Media </a:t>
+              <a:t>“IoT Platform” × “Transfer Protocol” × “Media </a:t>
             </a:r>
             <a:r>
               <a:rPr lang="en-US" sz="2000" dirty="0">
@@ -37545,18 +37244,7 @@
                 <a:ea typeface="HG明朝E" panose="02020909000000000000" pitchFamily="17" charset="-128"/>
                 <a:cs typeface="Arial" pitchFamily="34" charset="0"/>
               </a:rPr>
-              <a:t>Protocol </a:t>
-            </a:r>
-            <a:r>
-              <a:rPr lang="en-US" altLang="ja-JP" sz="2000" b="1" kern="0" dirty="0" smtClean="0">
-                <a:solidFill>
-                  <a:schemeClr val="bg1"/>
-                </a:solidFill>
-                <a:latin typeface="+mj-lt"/>
-                <a:ea typeface="HG明朝E" panose="02020909000000000000" pitchFamily="17" charset="-128"/>
-                <a:cs typeface="Arial" pitchFamily="34" charset="0"/>
-              </a:rPr>
-              <a:t>Bindings</a:t>
+              <a:t>Protocol Bindings</a:t>
             </a:r>
           </a:p>
           <a:p>
@@ -38286,20 +37974,6 @@
               </a:rPr>
               <a:t>Servient</a:t>
             </a:r>
-            <a:endParaRPr kumimoji="0" lang="en-US" altLang="ja-JP" sz="2000" b="1" i="0" u="none" strike="noStrike" kern="0" cap="none" spc="0" normalizeH="0" baseline="0" dirty="0" smtClean="0">
-              <a:ln>
-                <a:noFill/>
-              </a:ln>
-              <a:solidFill>
-                <a:srgbClr val="000000"/>
-              </a:solidFill>
-              <a:effectLst/>
-              <a:uLnTx/>
-              <a:uFillTx/>
-              <a:latin typeface="+mj-lt"/>
-              <a:ea typeface="HG明朝E" panose="02020909000000000000" pitchFamily="17" charset="-128"/>
-              <a:cs typeface="Arial" pitchFamily="34" charset="0"/>
-            </a:endParaRPr>
           </a:p>
         </p:txBody>
       </p:sp>
@@ -40542,17 +40216,7 @@
                 <a:ea typeface="HG明朝E" panose="02020909000000000000" pitchFamily="17" charset="-128"/>
                 <a:cs typeface="Arial" pitchFamily="34" charset="0"/>
               </a:rPr>
-              <a:t>Browser + </a:t>
-            </a:r>
-            <a:r>
-              <a:rPr lang="en-US" altLang="ja-JP" sz="2000" kern="0" dirty="0" smtClean="0">
-                <a:solidFill>
-                  <a:prstClr val="white"/>
-                </a:solidFill>
-                <a:ea typeface="HG明朝E" panose="02020909000000000000" pitchFamily="17" charset="-128"/>
-                <a:cs typeface="Arial" pitchFamily="34" charset="0"/>
-              </a:rPr>
-              <a:t>Library</a:t>
+              <a:t>Browser + Library</a:t>
             </a:r>
           </a:p>
         </p:txBody>
@@ -40735,13 +40399,6 @@
               </a:rPr>
               <a:t>(Existing Device)</a:t>
             </a:r>
-            <a:endParaRPr lang="en-US" altLang="ja-JP" sz="2000" b="1" kern="0" dirty="0" smtClean="0">
-              <a:solidFill>
-                <a:srgbClr val="000000"/>
-              </a:solidFill>
-              <a:ea typeface="HG明朝E" panose="02020909000000000000" pitchFamily="17" charset="-128"/>
-              <a:cs typeface="Arial" pitchFamily="34" charset="0"/>
-            </a:endParaRPr>
           </a:p>
         </p:txBody>
       </p:sp>
@@ -40803,13 +40460,6 @@
               </a:rPr>
               <a:t>Servient</a:t>
             </a:r>
-            <a:endParaRPr lang="en-US" altLang="ja-JP" sz="2000" b="1" kern="0" dirty="0" smtClean="0">
-              <a:solidFill>
-                <a:srgbClr val="000000"/>
-              </a:solidFill>
-              <a:ea typeface="HG明朝E" panose="02020909000000000000" pitchFamily="17" charset="-128"/>
-              <a:cs typeface="Arial" pitchFamily="34" charset="0"/>
-            </a:endParaRPr>
           </a:p>
         </p:txBody>
       </p:sp>
@@ -42161,20 +41811,6 @@
               </a:rPr>
               <a:t>Servient (Device)</a:t>
             </a:r>
-            <a:endParaRPr kumimoji="0" lang="en-US" altLang="ja-JP" sz="2000" b="1" i="0" u="none" strike="noStrike" kern="0" cap="none" spc="0" normalizeH="0" baseline="0" dirty="0" smtClean="0">
-              <a:ln>
-                <a:noFill/>
-              </a:ln>
-              <a:solidFill>
-                <a:srgbClr val="000000"/>
-              </a:solidFill>
-              <a:effectLst/>
-              <a:uLnTx/>
-              <a:uFillTx/>
-              <a:latin typeface="+mj-lt"/>
-              <a:ea typeface="HG明朝E" panose="02020909000000000000" pitchFamily="17" charset="-128"/>
-              <a:cs typeface="Arial" pitchFamily="34" charset="0"/>
-            </a:endParaRPr>
           </a:p>
         </p:txBody>
       </p:sp>
@@ -44310,17 +43946,7 @@
                 <a:ea typeface="HG明朝E" panose="02020909000000000000" pitchFamily="17" charset="-128"/>
                 <a:cs typeface="Arial" pitchFamily="34" charset="0"/>
               </a:rPr>
-              <a:t>Browser + </a:t>
-            </a:r>
-            <a:r>
-              <a:rPr lang="en-US" altLang="ja-JP" sz="2000" kern="0" dirty="0" smtClean="0">
-                <a:solidFill>
-                  <a:prstClr val="white"/>
-                </a:solidFill>
-                <a:ea typeface="HG明朝E" panose="02020909000000000000" pitchFamily="17" charset="-128"/>
-                <a:cs typeface="Arial" pitchFamily="34" charset="0"/>
-              </a:rPr>
-              <a:t>Library</a:t>
+              <a:t>Browser + Library</a:t>
             </a:r>
           </a:p>
         </p:txBody>
@@ -44505,20 +44131,6 @@
               </a:rPr>
               <a:t>Minimal Servient (Device)</a:t>
             </a:r>
-            <a:endParaRPr kumimoji="0" lang="en-US" altLang="ja-JP" sz="2000" b="1" i="0" u="none" strike="noStrike" kern="0" cap="none" spc="0" normalizeH="0" baseline="0" dirty="0" smtClean="0">
-              <a:ln>
-                <a:noFill/>
-              </a:ln>
-              <a:solidFill>
-                <a:srgbClr val="000000"/>
-              </a:solidFill>
-              <a:effectLst/>
-              <a:uLnTx/>
-              <a:uFillTx/>
-              <a:latin typeface="+mj-lt"/>
-              <a:ea typeface="HG明朝E" panose="02020909000000000000" pitchFamily="17" charset="-128"/>
-              <a:cs typeface="Arial" pitchFamily="34" charset="0"/>
-            </a:endParaRPr>
           </a:p>
         </p:txBody>
       </p:sp>
@@ -45992,7 +45604,7 @@
           <a:blip r:embed="rId4" cstate="print">
             <a:extLst>
               <a:ext uri="{BEBA8EAE-BF5A-486C-A8C5-ECC9F3942E4B}">
-                <a14:imgProps xmlns:a14="http://schemas.microsoft.com/office/drawing/2010/main" xmlns="">
+                <a14:imgProps xmlns="" xmlns:a14="http://schemas.microsoft.com/office/drawing/2010/main">
                   <a14:imgLayer r:embed="rId8">
                     <a14:imgEffect>
                       <a14:backgroundRemoval t="10000" b="90000" l="10000" r="90000"/>
@@ -46129,17 +45741,7 @@
                 <a:ea typeface="HG明朝E" panose="02020909000000000000" pitchFamily="17" charset="-128"/>
                 <a:cs typeface="Arial" pitchFamily="34" charset="0"/>
               </a:rPr>
-              <a:t>Browser + </a:t>
-            </a:r>
-            <a:r>
-              <a:rPr lang="en-US" altLang="ja-JP" sz="2000" kern="0" dirty="0" smtClean="0">
-                <a:solidFill>
-                  <a:prstClr val="white"/>
-                </a:solidFill>
-                <a:ea typeface="HG明朝E" panose="02020909000000000000" pitchFamily="17" charset="-128"/>
-                <a:cs typeface="Arial" pitchFamily="34" charset="0"/>
-              </a:rPr>
-              <a:t>Library</a:t>
+              <a:t>Browser + Library</a:t>
             </a:r>
           </a:p>
         </p:txBody>

</xml_diff>

<commit_message>
Changes discussed in #30
</commit_message>
<xml_diff>
--- a/images/wot-architecture-figures.pptx
+++ b/images/wot-architecture-figures.pptx
@@ -4603,7 +4603,9 @@
           <a:lstStyle/>
           <a:p>
             <a:pPr algn="ctr"/>
-            <a:endParaRPr lang="en-US"/>
+            <a:endParaRPr lang="en-US">
+              <a:latin typeface="+mj-lt"/>
+            </a:endParaRPr>
           </a:p>
         </p:txBody>
       </p:sp>
@@ -4677,7 +4679,7 @@
                 <a:effectLst/>
                 <a:uLnTx/>
                 <a:uFillTx/>
-                <a:latin typeface="Arial" pitchFamily="34" charset="0"/>
+                <a:latin typeface="+mj-lt"/>
                 <a:ea typeface="HG明朝E" panose="02020909000000000000" pitchFamily="17" charset="-128"/>
                 <a:cs typeface="Arial" pitchFamily="34" charset="0"/>
               </a:rPr>
@@ -4765,7 +4767,7 @@
                 <a:effectLst/>
                 <a:uLnTx/>
                 <a:uFillTx/>
-                <a:latin typeface="Arial" pitchFamily="34" charset="0"/>
+                <a:latin typeface="+mj-lt"/>
                 <a:ea typeface="HG明朝E" panose="02020909000000000000" pitchFamily="17" charset="-128"/>
                 <a:cs typeface="Arial" pitchFamily="34" charset="0"/>
               </a:endParaRPr>
@@ -4828,7 +4830,9 @@
               <a:lstStyle/>
               <a:p>
                 <a:pPr algn="ctr"/>
-                <a:endParaRPr lang="en-US" sz="4400"/>
+                <a:endParaRPr lang="en-US" sz="4400">
+                  <a:latin typeface="+mj-lt"/>
+                </a:endParaRPr>
               </a:p>
             </p:txBody>
           </p:sp>
@@ -4874,7 +4878,9 @@
               <a:lstStyle/>
               <a:p>
                 <a:pPr algn="ctr"/>
-                <a:endParaRPr lang="en-US" sz="4400"/>
+                <a:endParaRPr lang="en-US" sz="4400">
+                  <a:latin typeface="+mj-lt"/>
+                </a:endParaRPr>
               </a:p>
             </p:txBody>
           </p:sp>
@@ -4920,7 +4926,9 @@
               <a:lstStyle/>
               <a:p>
                 <a:pPr algn="ctr"/>
-                <a:endParaRPr lang="en-US" sz="4400"/>
+                <a:endParaRPr lang="en-US" sz="4400">
+                  <a:latin typeface="+mj-lt"/>
+                </a:endParaRPr>
               </a:p>
             </p:txBody>
           </p:sp>
@@ -4966,7 +4974,9 @@
               <a:lstStyle/>
               <a:p>
                 <a:pPr algn="ctr"/>
-                <a:endParaRPr lang="en-US" sz="4400"/>
+                <a:endParaRPr lang="en-US" sz="4400">
+                  <a:latin typeface="+mj-lt"/>
+                </a:endParaRPr>
               </a:p>
             </p:txBody>
           </p:sp>
@@ -4996,24 +5006,34 @@
           <a:p>
             <a:pPr algn="ctr"/>
             <a:r>
-              <a:rPr lang="en-US" sz="1600" b="1" dirty="0" smtClean="0"/>
+              <a:rPr lang="en-US" sz="1600" b="1" dirty="0" smtClean="0">
+                <a:latin typeface="+mj-lt"/>
+              </a:rPr>
               <a:t>Direct</a:t>
             </a:r>
             <a:br>
-              <a:rPr lang="en-US" sz="1600" b="1" dirty="0" smtClean="0"/>
+              <a:rPr lang="en-US" sz="1600" b="1" dirty="0" smtClean="0">
+                <a:latin typeface="+mj-lt"/>
+              </a:rPr>
             </a:br>
             <a:r>
-              <a:rPr lang="en-US" sz="1600" b="1" dirty="0" smtClean="0"/>
+              <a:rPr lang="en-US" sz="1600" b="1" dirty="0" smtClean="0">
+                <a:latin typeface="+mj-lt"/>
+              </a:rPr>
               <a:t>Thing-to-Thing</a:t>
             </a:r>
           </a:p>
           <a:p>
             <a:pPr algn="ctr"/>
             <a:r>
-              <a:rPr lang="en-US" sz="1600" b="1" dirty="0" smtClean="0"/>
+              <a:rPr lang="en-US" sz="1600" b="1" dirty="0" smtClean="0">
+                <a:latin typeface="+mj-lt"/>
+              </a:rPr>
               <a:t>Interaction</a:t>
             </a:r>
-            <a:endParaRPr lang="en-US" sz="1600" b="1" dirty="0"/>
+            <a:endParaRPr lang="en-US" sz="1600" b="1" dirty="0">
+              <a:latin typeface="+mj-lt"/>
+            </a:endParaRPr>
           </a:p>
         </p:txBody>
       </p:sp>
@@ -5060,7 +5080,7 @@
                 <a:solidFill>
                   <a:schemeClr val="bg1"/>
                 </a:solidFill>
-                <a:latin typeface="Arial" pitchFamily="34" charset="0"/>
+                <a:latin typeface="+mj-lt"/>
                 <a:ea typeface="HG明朝E" panose="02020909000000000000" pitchFamily="17" charset="-128"/>
                 <a:cs typeface="Arial" pitchFamily="34" charset="0"/>
               </a:rPr>
@@ -5070,7 +5090,7 @@
               <a:solidFill>
                 <a:schemeClr val="bg1"/>
               </a:solidFill>
-              <a:latin typeface="Arial" pitchFamily="34" charset="0"/>
+              <a:latin typeface="+mj-lt"/>
               <a:ea typeface="HG明朝E" panose="02020909000000000000" pitchFamily="17" charset="-128"/>
               <a:cs typeface="Arial" pitchFamily="34" charset="0"/>
             </a:endParaRPr>
@@ -5120,7 +5140,7 @@
                 <a:solidFill>
                   <a:schemeClr val="bg1"/>
                 </a:solidFill>
-                <a:latin typeface="Arial" pitchFamily="34" charset="0"/>
+                <a:latin typeface="+mj-lt"/>
                 <a:ea typeface="HG明朝E" panose="02020909000000000000" pitchFamily="17" charset="-128"/>
                 <a:cs typeface="Arial" pitchFamily="34" charset="0"/>
               </a:rPr>
@@ -5131,7 +5151,7 @@
                 <a:solidFill>
                   <a:schemeClr val="bg1"/>
                 </a:solidFill>
-                <a:latin typeface="Arial" pitchFamily="34" charset="0"/>
+                <a:latin typeface="+mj-lt"/>
                 <a:ea typeface="HG明朝E" panose="02020909000000000000" pitchFamily="17" charset="-128"/>
                 <a:cs typeface="Arial" pitchFamily="34" charset="0"/>
               </a:rPr>
@@ -5141,7 +5161,7 @@
                 <a:solidFill>
                   <a:schemeClr val="bg1"/>
                 </a:solidFill>
-                <a:latin typeface="Arial" pitchFamily="34" charset="0"/>
+                <a:latin typeface="+mj-lt"/>
                 <a:ea typeface="HG明朝E" panose="02020909000000000000" pitchFamily="17" charset="-128"/>
                 <a:cs typeface="Arial" pitchFamily="34" charset="0"/>
               </a:rPr>
@@ -5151,7 +5171,7 @@
               <a:solidFill>
                 <a:schemeClr val="bg1"/>
               </a:solidFill>
-              <a:latin typeface="Arial" pitchFamily="34" charset="0"/>
+              <a:latin typeface="+mj-lt"/>
               <a:ea typeface="HG明朝E" panose="02020909000000000000" pitchFamily="17" charset="-128"/>
               <a:cs typeface="Arial" pitchFamily="34" charset="0"/>
             </a:endParaRPr>
@@ -5201,7 +5221,7 @@
                 <a:solidFill>
                   <a:sysClr val="window" lastClr="FFFFFF"/>
                 </a:solidFill>
-                <a:latin typeface="Arial" pitchFamily="34" charset="0"/>
+                <a:latin typeface="+mj-lt"/>
                 <a:ea typeface="HG明朝E" panose="02020909000000000000" pitchFamily="17" charset="-128"/>
                 <a:cs typeface="Arial" pitchFamily="34" charset="0"/>
               </a:rPr>
@@ -5211,7 +5231,7 @@
               <a:solidFill>
                 <a:sysClr val="window" lastClr="FFFFFF"/>
               </a:solidFill>
-              <a:latin typeface="Arial" pitchFamily="34" charset="0"/>
+              <a:latin typeface="+mj-lt"/>
               <a:ea typeface="HG明朝E" panose="02020909000000000000" pitchFamily="17" charset="-128"/>
               <a:cs typeface="Arial" pitchFamily="34" charset="0"/>
             </a:endParaRPr>
@@ -5288,7 +5308,7 @@
                 <a:effectLst/>
                 <a:uLnTx/>
                 <a:uFillTx/>
-                <a:latin typeface="Arial" pitchFamily="34" charset="0"/>
+                <a:latin typeface="+mj-lt"/>
                 <a:ea typeface="HG明朝E" panose="02020909000000000000" pitchFamily="17" charset="-128"/>
                 <a:cs typeface="Arial" pitchFamily="34" charset="0"/>
               </a:rPr>
@@ -5376,7 +5396,7 @@
                 <a:effectLst/>
                 <a:uLnTx/>
                 <a:uFillTx/>
-                <a:latin typeface="Arial" pitchFamily="34" charset="0"/>
+                <a:latin typeface="+mj-lt"/>
                 <a:ea typeface="HG明朝E" panose="02020909000000000000" pitchFamily="17" charset="-128"/>
                 <a:cs typeface="Arial" pitchFamily="34" charset="0"/>
               </a:endParaRPr>
@@ -5439,7 +5459,9 @@
               <a:lstStyle/>
               <a:p>
                 <a:pPr algn="ctr"/>
-                <a:endParaRPr lang="en-US" sz="4400"/>
+                <a:endParaRPr lang="en-US" sz="4400">
+                  <a:latin typeface="+mj-lt"/>
+                </a:endParaRPr>
               </a:p>
             </p:txBody>
           </p:sp>
@@ -5485,7 +5507,9 @@
               <a:lstStyle/>
               <a:p>
                 <a:pPr algn="ctr"/>
-                <a:endParaRPr lang="en-US" sz="4400"/>
+                <a:endParaRPr lang="en-US" sz="4400">
+                  <a:latin typeface="+mj-lt"/>
+                </a:endParaRPr>
               </a:p>
             </p:txBody>
           </p:sp>
@@ -5531,7 +5555,9 @@
               <a:lstStyle/>
               <a:p>
                 <a:pPr algn="ctr"/>
-                <a:endParaRPr lang="en-US" sz="4400"/>
+                <a:endParaRPr lang="en-US" sz="4400">
+                  <a:latin typeface="+mj-lt"/>
+                </a:endParaRPr>
               </a:p>
             </p:txBody>
           </p:sp>
@@ -5577,7 +5603,9 @@
               <a:lstStyle/>
               <a:p>
                 <a:pPr algn="ctr"/>
-                <a:endParaRPr lang="en-US" sz="4400"/>
+                <a:endParaRPr lang="en-US" sz="4400">
+                  <a:latin typeface="+mj-lt"/>
+                </a:endParaRPr>
               </a:p>
             </p:txBody>
           </p:sp>
@@ -5607,14 +5635,20 @@
           <a:p>
             <a:pPr algn="ctr"/>
             <a:r>
-              <a:rPr lang="en-US" sz="1600" b="1" dirty="0" smtClean="0"/>
+              <a:rPr lang="en-US" sz="1600" b="1" dirty="0" smtClean="0">
+                <a:latin typeface="+mj-lt"/>
+              </a:rPr>
               <a:t>Complement</a:t>
             </a:r>
             <a:br>
-              <a:rPr lang="en-US" sz="1600" b="1" dirty="0" smtClean="0"/>
+              <a:rPr lang="en-US" sz="1600" b="1" dirty="0" smtClean="0">
+                <a:latin typeface="+mj-lt"/>
+              </a:rPr>
             </a:br>
             <a:r>
-              <a:rPr lang="en-US" sz="1600" b="1" dirty="0" smtClean="0"/>
+              <a:rPr lang="en-US" sz="1600" b="1" dirty="0" smtClean="0">
+                <a:latin typeface="+mj-lt"/>
+              </a:rPr>
               <a:t>Existing Devices</a:t>
             </a:r>
           </a:p>
@@ -5644,10 +5678,14 @@
           <a:p>
             <a:pPr algn="ctr"/>
             <a:r>
-              <a:rPr lang="en-US" sz="1200" smtClean="0"/>
+              <a:rPr lang="en-US" sz="1200" smtClean="0">
+                <a:latin typeface="+mj-lt"/>
+              </a:rPr>
               <a:t>+</a:t>
             </a:r>
-            <a:endParaRPr lang="en-US" sz="1200"/>
+            <a:endParaRPr lang="en-US" sz="1200">
+              <a:latin typeface="+mj-lt"/>
+            </a:endParaRPr>
           </a:p>
         </p:txBody>
       </p:sp>
@@ -5659,8 +5697,8 @@
         </p:nvSpPr>
         <p:spPr>
           <a:xfrm>
-            <a:off x="8673977" y="5127722"/>
-            <a:ext cx="548548" cy="253916"/>
+            <a:off x="8742907" y="5127722"/>
+            <a:ext cx="479618" cy="246221"/>
           </a:xfrm>
           <a:prstGeom prst="rect">
             <a:avLst/>
@@ -5676,13 +5714,13 @@
             <a:pPr algn="r"/>
             <a:r>
               <a:rPr lang="en-US" sz="1000" b="1" smtClean="0">
-                <a:latin typeface="Arial" panose="020B0604020202020204" pitchFamily="34" charset="0"/>
+                <a:latin typeface="+mj-lt"/>
                 <a:cs typeface="Arial" panose="020B0604020202020204" pitchFamily="34" charset="0"/>
               </a:rPr>
               <a:t>Thing</a:t>
             </a:r>
             <a:endParaRPr lang="en-US" sz="1000" b="1">
-              <a:latin typeface="Arial" panose="020B0604020202020204" pitchFamily="34" charset="0"/>
+              <a:latin typeface="+mj-lt"/>
               <a:cs typeface="Arial" panose="020B0604020202020204" pitchFamily="34" charset="0"/>
             </a:endParaRPr>
           </a:p>
@@ -5712,11 +5750,14 @@
           <a:p>
             <a:r>
               <a:rPr lang="en-US" sz="1200" b="1" smtClean="0">
+                <a:latin typeface="+mj-lt"/>
                 <a:sym typeface="Symbol"/>
               </a:rPr>
               <a:t></a:t>
             </a:r>
-            <a:endParaRPr lang="en-US" sz="1200" b="1"/>
+            <a:endParaRPr lang="en-US" sz="1200" b="1">
+              <a:latin typeface="+mj-lt"/>
+            </a:endParaRPr>
           </a:p>
         </p:txBody>
       </p:sp>
@@ -5762,7 +5803,9 @@
           <a:lstStyle/>
           <a:p>
             <a:pPr algn="ctr"/>
-            <a:endParaRPr lang="en-US" sz="4400"/>
+            <a:endParaRPr lang="en-US" sz="4400">
+              <a:latin typeface="+mj-lt"/>
+            </a:endParaRPr>
           </a:p>
         </p:txBody>
       </p:sp>
@@ -5836,7 +5879,7 @@
                 <a:effectLst/>
                 <a:uLnTx/>
                 <a:uFillTx/>
-                <a:latin typeface="Arial" pitchFamily="34" charset="0"/>
+                <a:latin typeface="+mj-lt"/>
                 <a:ea typeface="HG明朝E" panose="02020909000000000000" pitchFamily="17" charset="-128"/>
                 <a:cs typeface="Arial" pitchFamily="34" charset="0"/>
               </a:rPr>
@@ -5924,7 +5967,7 @@
                 <a:effectLst/>
                 <a:uLnTx/>
                 <a:uFillTx/>
-                <a:latin typeface="Arial" pitchFamily="34" charset="0"/>
+                <a:latin typeface="+mj-lt"/>
                 <a:ea typeface="HG明朝E" panose="02020909000000000000" pitchFamily="17" charset="-128"/>
                 <a:cs typeface="Arial" pitchFamily="34" charset="0"/>
               </a:endParaRPr>
@@ -5987,7 +6030,9 @@
               <a:lstStyle/>
               <a:p>
                 <a:pPr algn="ctr"/>
-                <a:endParaRPr lang="en-US" sz="4400"/>
+                <a:endParaRPr lang="en-US" sz="4400">
+                  <a:latin typeface="+mj-lt"/>
+                </a:endParaRPr>
               </a:p>
             </p:txBody>
           </p:sp>
@@ -6033,7 +6078,9 @@
               <a:lstStyle/>
               <a:p>
                 <a:pPr algn="ctr"/>
-                <a:endParaRPr lang="en-US" sz="4400"/>
+                <a:endParaRPr lang="en-US" sz="4400">
+                  <a:latin typeface="+mj-lt"/>
+                </a:endParaRPr>
               </a:p>
             </p:txBody>
           </p:sp>
@@ -6079,7 +6126,9 @@
               <a:lstStyle/>
               <a:p>
                 <a:pPr algn="ctr"/>
-                <a:endParaRPr lang="en-US" sz="4400"/>
+                <a:endParaRPr lang="en-US" sz="4400">
+                  <a:latin typeface="+mj-lt"/>
+                </a:endParaRPr>
               </a:p>
             </p:txBody>
           </p:sp>
@@ -6125,7 +6174,9 @@
               <a:lstStyle/>
               <a:p>
                 <a:pPr algn="ctr"/>
-                <a:endParaRPr lang="en-US" sz="4400"/>
+                <a:endParaRPr lang="en-US" sz="4400">
+                  <a:latin typeface="+mj-lt"/>
+                </a:endParaRPr>
               </a:p>
             </p:txBody>
           </p:sp>
@@ -6174,7 +6225,7 @@
                 <a:solidFill>
                   <a:schemeClr val="bg1"/>
                 </a:solidFill>
-                <a:latin typeface="Arial" pitchFamily="34" charset="0"/>
+                <a:latin typeface="+mj-lt"/>
                 <a:ea typeface="HG明朝E" panose="02020909000000000000" pitchFamily="17" charset="-128"/>
                 <a:cs typeface="Arial" pitchFamily="34" charset="0"/>
               </a:rPr>
@@ -6184,7 +6235,7 @@
               <a:solidFill>
                 <a:schemeClr val="bg1"/>
               </a:solidFill>
-              <a:latin typeface="Arial" pitchFamily="34" charset="0"/>
+              <a:latin typeface="+mj-lt"/>
               <a:ea typeface="HG明朝E" panose="02020909000000000000" pitchFamily="17" charset="-128"/>
               <a:cs typeface="Arial" pitchFamily="34" charset="0"/>
             </a:endParaRPr>
@@ -6234,7 +6285,7 @@
                 <a:solidFill>
                   <a:schemeClr val="bg1"/>
                 </a:solidFill>
-                <a:latin typeface="Arial" pitchFamily="34" charset="0"/>
+                <a:latin typeface="+mj-lt"/>
                 <a:ea typeface="HG明朝E" panose="02020909000000000000" pitchFamily="17" charset="-128"/>
                 <a:cs typeface="Arial" pitchFamily="34" charset="0"/>
               </a:rPr>
@@ -6244,7 +6295,7 @@
               <a:solidFill>
                 <a:schemeClr val="bg1"/>
               </a:solidFill>
-              <a:latin typeface="Arial" pitchFamily="34" charset="0"/>
+              <a:latin typeface="+mj-lt"/>
               <a:ea typeface="HG明朝E" panose="02020909000000000000" pitchFamily="17" charset="-128"/>
               <a:cs typeface="Arial" pitchFamily="34" charset="0"/>
             </a:endParaRPr>
@@ -6293,14 +6344,14 @@
             </a:pPr>
             <a:r>
               <a:rPr lang="en-US" altLang="ja-JP" sz="800" kern="0" dirty="0" smtClean="0">
-                <a:latin typeface="Arial" pitchFamily="34" charset="0"/>
+                <a:latin typeface="+mj-lt"/>
                 <a:ea typeface="HG明朝E" panose="02020909000000000000" pitchFamily="17" charset="-128"/>
                 <a:cs typeface="Arial" pitchFamily="34" charset="0"/>
               </a:rPr>
               <a:t>App Script</a:t>
             </a:r>
             <a:endParaRPr lang="en-US" altLang="ja-JP" sz="800" kern="0" dirty="0">
-              <a:latin typeface="Arial" pitchFamily="34" charset="0"/>
+              <a:latin typeface="+mj-lt"/>
               <a:ea typeface="HG明朝E" panose="02020909000000000000" pitchFamily="17" charset="-128"/>
               <a:cs typeface="Arial" pitchFamily="34" charset="0"/>
             </a:endParaRPr>
@@ -6350,7 +6401,7 @@
                 <a:solidFill>
                   <a:sysClr val="window" lastClr="FFFFFF"/>
                 </a:solidFill>
-                <a:latin typeface="Arial" pitchFamily="34" charset="0"/>
+                <a:latin typeface="+mj-lt"/>
                 <a:ea typeface="HG明朝E" panose="02020909000000000000" pitchFamily="17" charset="-128"/>
                 <a:cs typeface="Arial" pitchFamily="34" charset="0"/>
               </a:rPr>
@@ -6360,7 +6411,7 @@
               <a:solidFill>
                 <a:sysClr val="window" lastClr="FFFFFF"/>
               </a:solidFill>
-              <a:latin typeface="Arial" pitchFamily="34" charset="0"/>
+              <a:latin typeface="+mj-lt"/>
               <a:ea typeface="HG明朝E" panose="02020909000000000000" pitchFamily="17" charset="-128"/>
               <a:cs typeface="Arial" pitchFamily="34" charset="0"/>
             </a:endParaRPr>
@@ -6379,7 +6430,7 @@
           <a:blip r:embed="rId3" cstate="print">
             <a:extLst>
               <a:ext uri="{28A0092B-C50C-407E-A947-70E740481C1C}">
-                <a14:useLocalDpi xmlns:a14="http://schemas.microsoft.com/office/drawing/2010/main" xmlns="" val="0"/>
+                <a14:useLocalDpi xmlns="" xmlns:a14="http://schemas.microsoft.com/office/drawing/2010/main" val="0"/>
               </a:ext>
             </a:extLst>
           </a:blip>
@@ -6470,7 +6521,9 @@
               <a:lstStyle/>
               <a:p>
                 <a:pPr algn="ctr"/>
-                <a:endParaRPr lang="en-US"/>
+                <a:endParaRPr lang="en-US">
+                  <a:latin typeface="+mj-lt"/>
+                </a:endParaRPr>
               </a:p>
             </p:txBody>
           </p:sp>
@@ -6514,7 +6567,9 @@
               <a:lstStyle/>
               <a:p>
                 <a:pPr algn="ctr"/>
-                <a:endParaRPr lang="en-US"/>
+                <a:endParaRPr lang="en-US">
+                  <a:latin typeface="+mj-lt"/>
+                </a:endParaRPr>
               </a:p>
             </p:txBody>
           </p:sp>
@@ -6543,10 +6598,14 @@
             <a:p>
               <a:pPr algn="ctr"/>
               <a:r>
-                <a:rPr lang="en-US" sz="1600" b="1" dirty="0" smtClean="0"/>
+                <a:rPr lang="en-US" sz="1600" b="1" dirty="0" smtClean="0">
+                  <a:latin typeface="+mj-lt"/>
+                </a:rPr>
                 <a:t>Gateway</a:t>
               </a:r>
-              <a:endParaRPr lang="en-US" sz="1600" b="1" dirty="0"/>
+              <a:endParaRPr lang="en-US" sz="1600" b="1" dirty="0">
+                <a:latin typeface="+mj-lt"/>
+              </a:endParaRPr>
             </a:p>
           </p:txBody>
         </p:sp>
@@ -6592,7 +6651,9 @@
             <a:lstStyle/>
             <a:p>
               <a:pPr algn="ctr"/>
-              <a:endParaRPr lang="en-US" sz="4400"/>
+              <a:endParaRPr lang="en-US" sz="4400">
+                <a:latin typeface="+mj-lt"/>
+              </a:endParaRPr>
             </a:p>
           </p:txBody>
         </p:sp>
@@ -6666,7 +6727,7 @@
                   <a:effectLst/>
                   <a:uLnTx/>
                   <a:uFillTx/>
-                  <a:latin typeface="Arial" pitchFamily="34" charset="0"/>
+                  <a:latin typeface="+mj-lt"/>
                   <a:ea typeface="HG明朝E" panose="02020909000000000000" pitchFamily="17" charset="-128"/>
                   <a:cs typeface="Arial" pitchFamily="34" charset="0"/>
                 </a:rPr>
@@ -6738,7 +6799,7 @@
                   <a:effectLst/>
                   <a:uLnTx/>
                   <a:uFillTx/>
-                  <a:latin typeface="Arial" pitchFamily="34" charset="0"/>
+                  <a:latin typeface="+mj-lt"/>
                   <a:ea typeface="HG明朝E" panose="02020909000000000000" pitchFamily="17" charset="-128"/>
                   <a:cs typeface="Arial" pitchFamily="34" charset="0"/>
                 </a:rPr>
@@ -6754,7 +6815,7 @@
                 <a:effectLst/>
                 <a:uLnTx/>
                 <a:uFillTx/>
-                <a:latin typeface="Arial" pitchFamily="34" charset="0"/>
+                <a:latin typeface="+mj-lt"/>
                 <a:ea typeface="HG明朝E" panose="02020909000000000000" pitchFamily="17" charset="-128"/>
                 <a:cs typeface="Arial" pitchFamily="34" charset="0"/>
               </a:endParaRPr>
@@ -6840,7 +6901,7 @@
                   <a:effectLst/>
                   <a:uLnTx/>
                   <a:uFillTx/>
-                  <a:latin typeface="Arial" pitchFamily="34" charset="0"/>
+                  <a:latin typeface="+mj-lt"/>
                   <a:ea typeface="HG明朝E" panose="02020909000000000000" pitchFamily="17" charset="-128"/>
                   <a:cs typeface="Arial" pitchFamily="34" charset="0"/>
                 </a:endParaRPr>
@@ -6915,7 +6976,7 @@
                     <a:effectLst/>
                     <a:uLnTx/>
                     <a:uFillTx/>
-                    <a:latin typeface="Calibri"/>
+                    <a:latin typeface="+mj-lt"/>
                     <a:ea typeface="+mn-ea"/>
                     <a:cs typeface="+mn-cs"/>
                   </a:endParaRPr>
@@ -6976,7 +7037,7 @@
                     <a:effectLst/>
                     <a:uLnTx/>
                     <a:uFillTx/>
-                    <a:latin typeface="Calibri"/>
+                    <a:latin typeface="+mj-lt"/>
                     <a:ea typeface="+mn-ea"/>
                     <a:cs typeface="+mn-cs"/>
                   </a:endParaRPr>
@@ -7037,7 +7098,7 @@
                     <a:effectLst/>
                     <a:uLnTx/>
                     <a:uFillTx/>
-                    <a:latin typeface="Calibri"/>
+                    <a:latin typeface="+mj-lt"/>
                     <a:ea typeface="+mn-ea"/>
                     <a:cs typeface="+mn-cs"/>
                   </a:endParaRPr>
@@ -7098,7 +7159,7 @@
                     <a:effectLst/>
                     <a:uLnTx/>
                     <a:uFillTx/>
-                    <a:latin typeface="Calibri"/>
+                    <a:latin typeface="+mj-lt"/>
                     <a:ea typeface="+mn-ea"/>
                     <a:cs typeface="+mn-cs"/>
                   </a:endParaRPr>
@@ -7170,7 +7231,7 @@
                   <a:effectLst/>
                   <a:uLnTx/>
                   <a:uFillTx/>
-                  <a:latin typeface="Arial" pitchFamily="34" charset="0"/>
+                  <a:latin typeface="+mj-lt"/>
                   <a:ea typeface="HG明朝E" panose="02020909000000000000" pitchFamily="17" charset="-128"/>
                   <a:cs typeface="Arial" pitchFamily="34" charset="0"/>
                 </a:rPr>
@@ -7186,7 +7247,7 @@
                 <a:effectLst/>
                 <a:uLnTx/>
                 <a:uFillTx/>
-                <a:latin typeface="Arial" pitchFamily="34" charset="0"/>
+                <a:latin typeface="+mj-lt"/>
                 <a:ea typeface="HG明朝E" panose="02020909000000000000" pitchFamily="17" charset="-128"/>
                 <a:cs typeface="Arial" pitchFamily="34" charset="0"/>
               </a:endParaRPr>
@@ -7244,6 +7305,7 @@
                 <a:solidFill>
                   <a:prstClr val="black"/>
                 </a:solidFill>
+                <a:latin typeface="+mj-lt"/>
                 <a:ea typeface="HG明朝E" panose="02020909000000000000" pitchFamily="17" charset="-128"/>
                 <a:cs typeface="Arial" pitchFamily="34" charset="0"/>
               </a:endParaRPr>
@@ -7313,7 +7375,7 @@
                   <a:effectLst/>
                   <a:uLnTx/>
                   <a:uFillTx/>
-                  <a:latin typeface="Arial" pitchFamily="34" charset="0"/>
+                  <a:latin typeface="+mj-lt"/>
                   <a:ea typeface="HG明朝E" panose="02020909000000000000" pitchFamily="17" charset="-128"/>
                   <a:cs typeface="Arial" pitchFamily="34" charset="0"/>
                 </a:rPr>
@@ -7329,7 +7391,7 @@
                 <a:effectLst/>
                 <a:uLnTx/>
                 <a:uFillTx/>
-                <a:latin typeface="Arial" pitchFamily="34" charset="0"/>
+                <a:latin typeface="+mj-lt"/>
                 <a:ea typeface="HG明朝E" panose="02020909000000000000" pitchFamily="17" charset="-128"/>
                 <a:cs typeface="Arial" pitchFamily="34" charset="0"/>
               </a:endParaRPr>
@@ -7401,7 +7463,7 @@
                   <a:effectLst/>
                   <a:uLnTx/>
                   <a:uFillTx/>
-                  <a:latin typeface="Arial" pitchFamily="34" charset="0"/>
+                  <a:latin typeface="+mj-lt"/>
                   <a:ea typeface="HG明朝E" panose="02020909000000000000" pitchFamily="17" charset="-128"/>
                   <a:cs typeface="Arial" pitchFamily="34" charset="0"/>
                 </a:rPr>
@@ -7417,7 +7479,7 @@
                 <a:effectLst/>
                 <a:uLnTx/>
                 <a:uFillTx/>
-                <a:latin typeface="Arial" pitchFamily="34" charset="0"/>
+                <a:latin typeface="+mj-lt"/>
                 <a:ea typeface="HG明朝E" panose="02020909000000000000" pitchFamily="17" charset="-128"/>
                 <a:cs typeface="Arial" pitchFamily="34" charset="0"/>
               </a:endParaRPr>
@@ -7479,7 +7541,7 @@
                 <a:defRPr/>
               </a:pPr>
               <a:r>
-                <a:rPr kumimoji="0" lang="en-US" altLang="ja-JP" sz="800" b="0" i="0" u="none" strike="noStrike" kern="0" cap="none" spc="0" normalizeH="0" baseline="0" smtClean="0">
+                <a:rPr kumimoji="0" lang="en-US" altLang="ja-JP" sz="800" b="0" i="0" u="none" strike="noStrike" kern="0" cap="none" spc="0" normalizeH="0" baseline="0" dirty="0" smtClean="0">
                   <a:ln>
                     <a:noFill/>
                   </a:ln>
@@ -7489,30 +7551,13 @@
                   <a:effectLst/>
                   <a:uLnTx/>
                   <a:uFillTx/>
-                  <a:latin typeface="Arial" pitchFamily="34" charset="0"/>
+                  <a:latin typeface="+mj-lt"/>
                   <a:ea typeface="HG明朝E" panose="02020909000000000000" pitchFamily="17" charset="-128"/>
                   <a:cs typeface="Arial" pitchFamily="34" charset="0"/>
                 </a:rPr>
-                <a:t>Orchestr.</a:t>
+                <a:t>Control Agent</a:t>
               </a:r>
-              <a:r>
-                <a:rPr kumimoji="0" lang="en-US" altLang="ja-JP" sz="800" b="0" i="0" u="none" strike="noStrike" kern="0" cap="none" spc="0" normalizeH="0" smtClean="0">
-                  <a:ln>
-                    <a:noFill/>
-                  </a:ln>
-                  <a:solidFill>
-                    <a:sysClr val="windowText" lastClr="000000"/>
-                  </a:solidFill>
-                  <a:effectLst/>
-                  <a:uLnTx/>
-                  <a:uFillTx/>
-                  <a:latin typeface="Arial" pitchFamily="34" charset="0"/>
-                  <a:ea typeface="HG明朝E" panose="02020909000000000000" pitchFamily="17" charset="-128"/>
-                  <a:cs typeface="Arial" pitchFamily="34" charset="0"/>
-                </a:rPr>
-                <a:t> Client</a:t>
-              </a:r>
-              <a:endParaRPr kumimoji="0" lang="en-US" altLang="ja-JP" sz="800" b="0" i="0" u="none" strike="noStrike" kern="0" cap="none" spc="0" normalizeH="0" baseline="0">
+              <a:endParaRPr kumimoji="0" lang="en-US" altLang="ja-JP" sz="800" b="0" i="0" u="none" strike="noStrike" kern="0" cap="none" spc="0" normalizeH="0" baseline="0" dirty="0">
                 <a:ln>
                   <a:noFill/>
                 </a:ln>
@@ -7522,7 +7567,7 @@
                 <a:effectLst/>
                 <a:uLnTx/>
                 <a:uFillTx/>
-                <a:latin typeface="Arial" pitchFamily="34" charset="0"/>
+                <a:latin typeface="+mj-lt"/>
                 <a:ea typeface="HG明朝E" panose="02020909000000000000" pitchFamily="17" charset="-128"/>
                 <a:cs typeface="Arial" pitchFamily="34" charset="0"/>
               </a:endParaRPr>
@@ -7594,7 +7639,7 @@
                   <a:effectLst/>
                   <a:uLnTx/>
                   <a:uFillTx/>
-                  <a:latin typeface="Arial" pitchFamily="34" charset="0"/>
+                  <a:latin typeface="+mj-lt"/>
                   <a:ea typeface="HG明朝E" panose="02020909000000000000" pitchFamily="17" charset="-128"/>
                   <a:cs typeface="Arial" pitchFamily="34" charset="0"/>
                 </a:rPr>
@@ -7610,7 +7655,7 @@
                 <a:effectLst/>
                 <a:uLnTx/>
                 <a:uFillTx/>
-                <a:latin typeface="Arial" pitchFamily="34" charset="0"/>
+                <a:latin typeface="+mj-lt"/>
                 <a:ea typeface="HG明朝E" panose="02020909000000000000" pitchFamily="17" charset="-128"/>
                 <a:cs typeface="Arial" pitchFamily="34" charset="0"/>
               </a:endParaRPr>
@@ -7696,7 +7741,7 @@
                   <a:effectLst/>
                   <a:uLnTx/>
                   <a:uFillTx/>
-                  <a:latin typeface="Arial" pitchFamily="34" charset="0"/>
+                  <a:latin typeface="+mj-lt"/>
                   <a:ea typeface="HG明朝E" panose="02020909000000000000" pitchFamily="17" charset="-128"/>
                   <a:cs typeface="Arial" pitchFamily="34" charset="0"/>
                 </a:endParaRPr>
@@ -7771,7 +7816,7 @@
                     <a:effectLst/>
                     <a:uLnTx/>
                     <a:uFillTx/>
-                    <a:latin typeface="Calibri"/>
+                    <a:latin typeface="+mj-lt"/>
                     <a:ea typeface="+mn-ea"/>
                     <a:cs typeface="+mn-cs"/>
                   </a:endParaRPr>
@@ -7832,7 +7877,7 @@
                     <a:effectLst/>
                     <a:uLnTx/>
                     <a:uFillTx/>
-                    <a:latin typeface="Calibri"/>
+                    <a:latin typeface="+mj-lt"/>
                     <a:ea typeface="+mn-ea"/>
                     <a:cs typeface="+mn-cs"/>
                   </a:endParaRPr>
@@ -7893,7 +7938,7 @@
                     <a:effectLst/>
                     <a:uLnTx/>
                     <a:uFillTx/>
-                    <a:latin typeface="Calibri"/>
+                    <a:latin typeface="+mj-lt"/>
                     <a:ea typeface="+mn-ea"/>
                     <a:cs typeface="+mn-cs"/>
                   </a:endParaRPr>
@@ -7954,7 +7999,7 @@
                     <a:effectLst/>
                     <a:uLnTx/>
                     <a:uFillTx/>
-                    <a:latin typeface="Calibri"/>
+                    <a:latin typeface="+mj-lt"/>
                     <a:ea typeface="+mn-ea"/>
                     <a:cs typeface="+mn-cs"/>
                   </a:endParaRPr>
@@ -7994,7 +8039,7 @@
             <a:effectLst/>
             <a:extLst>
               <a:ext uri="{AF507438-7753-43E0-B8FC-AC1667EBCBE1}">
-                <a14:hiddenEffects xmlns:a14="http://schemas.microsoft.com/office/drawing/2010/main" xmlns="">
+                <a14:hiddenEffects xmlns="" xmlns:a14="http://schemas.microsoft.com/office/drawing/2010/main">
                   <a:effectLst>
                     <a:outerShdw blurRad="63500" dist="35921" dir="2700000" algn="ctr" rotWithShape="0">
                       <a:schemeClr val="bg2"/>
@@ -8037,7 +8082,7 @@
             <a:effectLst/>
             <a:extLst>
               <a:ext uri="{AF507438-7753-43E0-B8FC-AC1667EBCBE1}">
-                <a14:hiddenEffects xmlns:a14="http://schemas.microsoft.com/office/drawing/2010/main" xmlns="">
+                <a14:hiddenEffects xmlns="" xmlns:a14="http://schemas.microsoft.com/office/drawing/2010/main">
                   <a:effectLst>
                     <a:outerShdw blurRad="63500" dist="35921" dir="2700000" algn="ctr" rotWithShape="0">
                       <a:schemeClr val="bg2"/>
@@ -8060,7 +8105,7 @@
             <a:blip r:embed="rId4" cstate="print">
               <a:extLst>
                 <a:ext uri="{28A0092B-C50C-407E-A947-70E740481C1C}">
-                  <a14:useLocalDpi xmlns:a14="http://schemas.microsoft.com/office/drawing/2010/main" xmlns="" val="0"/>
+                  <a14:useLocalDpi xmlns="" xmlns:a14="http://schemas.microsoft.com/office/drawing/2010/main" val="0"/>
                 </a:ext>
               </a:extLst>
             </a:blip>
@@ -8138,7 +8183,9 @@
             <a:lstStyle/>
             <a:p>
               <a:pPr algn="ctr"/>
-              <a:endParaRPr lang="en-US"/>
+              <a:endParaRPr lang="en-US">
+                <a:latin typeface="+mj-lt"/>
+              </a:endParaRPr>
             </a:p>
           </p:txBody>
         </p:sp>
@@ -8182,7 +8229,9 @@
             <a:lstStyle/>
             <a:p>
               <a:pPr algn="ctr"/>
-              <a:endParaRPr lang="en-US"/>
+              <a:endParaRPr lang="en-US">
+                <a:latin typeface="+mj-lt"/>
+              </a:endParaRPr>
             </a:p>
           </p:txBody>
         </p:sp>
@@ -8226,7 +8275,9 @@
             <a:lstStyle/>
             <a:p>
               <a:pPr algn="ctr"/>
-              <a:endParaRPr lang="en-US"/>
+              <a:endParaRPr lang="en-US">
+                <a:latin typeface="+mj-lt"/>
+              </a:endParaRPr>
             </a:p>
           </p:txBody>
         </p:sp>
@@ -8270,7 +8321,9 @@
             <a:lstStyle/>
             <a:p>
               <a:pPr algn="ctr"/>
-              <a:endParaRPr lang="en-US"/>
+              <a:endParaRPr lang="en-US">
+                <a:latin typeface="+mj-lt"/>
+              </a:endParaRPr>
             </a:p>
           </p:txBody>
         </p:sp>
@@ -8317,7 +8370,9 @@
           <a:lstStyle/>
           <a:p>
             <a:pPr algn="ctr"/>
-            <a:endParaRPr lang="en-US" sz="4400"/>
+            <a:endParaRPr lang="en-US" sz="4400">
+              <a:latin typeface="+mj-lt"/>
+            </a:endParaRPr>
           </a:p>
         </p:txBody>
       </p:sp>
@@ -8363,7 +8418,9 @@
           <a:lstStyle/>
           <a:p>
             <a:pPr algn="ctr"/>
-            <a:endParaRPr lang="en-US" sz="4400"/>
+            <a:endParaRPr lang="en-US" sz="4400">
+              <a:latin typeface="+mj-lt"/>
+            </a:endParaRPr>
           </a:p>
         </p:txBody>
       </p:sp>
@@ -8391,10 +8448,14 @@
           <a:p>
             <a:pPr algn="ctr"/>
             <a:r>
-              <a:rPr lang="en-US" sz="1600" b="1" dirty="0" smtClean="0"/>
+              <a:rPr lang="en-US" sz="1600" b="1" dirty="0" smtClean="0">
+                <a:latin typeface="+mj-lt"/>
+              </a:rPr>
               <a:t>Cloud</a:t>
             </a:r>
-            <a:endParaRPr lang="en-US" sz="1600" b="1" dirty="0"/>
+            <a:endParaRPr lang="en-US" sz="1600" b="1" dirty="0">
+              <a:latin typeface="+mj-lt"/>
+            </a:endParaRPr>
           </a:p>
         </p:txBody>
       </p:sp>
@@ -8458,7 +8519,7 @@
               <a:defRPr/>
             </a:pPr>
             <a:r>
-              <a:rPr kumimoji="0" lang="en-US" altLang="ja-JP" sz="1000" b="1" i="0" u="none" strike="noStrike" kern="0" cap="none" spc="0" normalizeH="0" baseline="0" smtClean="0">
+              <a:rPr kumimoji="0" lang="en-US" altLang="ja-JP" sz="1000" b="1" i="0" u="none" strike="noStrike" kern="0" cap="none" spc="0" normalizeH="0" baseline="0" dirty="0" smtClean="0">
                 <a:ln>
                   <a:noFill/>
                 </a:ln>
@@ -8468,7 +8529,7 @@
                 <a:effectLst/>
                 <a:uLnTx/>
                 <a:uFillTx/>
-                <a:latin typeface="Arial" pitchFamily="34" charset="0"/>
+                <a:latin typeface="+mj-lt"/>
                 <a:ea typeface="HG明朝E" panose="02020909000000000000" pitchFamily="17" charset="-128"/>
                 <a:cs typeface="Arial" pitchFamily="34" charset="0"/>
               </a:rPr>
@@ -8540,7 +8601,7 @@
                 <a:effectLst/>
                 <a:uLnTx/>
                 <a:uFillTx/>
-                <a:latin typeface="Arial" pitchFamily="34" charset="0"/>
+                <a:latin typeface="+mj-lt"/>
                 <a:ea typeface="HG明朝E" panose="02020909000000000000" pitchFamily="17" charset="-128"/>
                 <a:cs typeface="Arial" pitchFamily="34" charset="0"/>
               </a:rPr>
@@ -8556,7 +8617,7 @@
               <a:effectLst/>
               <a:uLnTx/>
               <a:uFillTx/>
-              <a:latin typeface="Arial" pitchFamily="34" charset="0"/>
+              <a:latin typeface="+mj-lt"/>
               <a:ea typeface="HG明朝E" panose="02020909000000000000" pitchFamily="17" charset="-128"/>
               <a:cs typeface="Arial" pitchFamily="34" charset="0"/>
             </a:endParaRPr>
@@ -8642,7 +8703,7 @@
                 <a:effectLst/>
                 <a:uLnTx/>
                 <a:uFillTx/>
-                <a:latin typeface="Arial" pitchFamily="34" charset="0"/>
+                <a:latin typeface="+mj-lt"/>
                 <a:ea typeface="HG明朝E" panose="02020909000000000000" pitchFamily="17" charset="-128"/>
                 <a:cs typeface="Arial" pitchFamily="34" charset="0"/>
               </a:endParaRPr>
@@ -8717,7 +8778,7 @@
                   <a:effectLst/>
                   <a:uLnTx/>
                   <a:uFillTx/>
-                  <a:latin typeface="Calibri"/>
+                  <a:latin typeface="+mj-lt"/>
                   <a:ea typeface="+mn-ea"/>
                   <a:cs typeface="+mn-cs"/>
                 </a:endParaRPr>
@@ -8778,7 +8839,7 @@
                   <a:effectLst/>
                   <a:uLnTx/>
                   <a:uFillTx/>
-                  <a:latin typeface="Calibri"/>
+                  <a:latin typeface="+mj-lt"/>
                   <a:ea typeface="+mn-ea"/>
                   <a:cs typeface="+mn-cs"/>
                 </a:endParaRPr>
@@ -8839,7 +8900,7 @@
                   <a:effectLst/>
                   <a:uLnTx/>
                   <a:uFillTx/>
-                  <a:latin typeface="Calibri"/>
+                  <a:latin typeface="+mj-lt"/>
                   <a:ea typeface="+mn-ea"/>
                   <a:cs typeface="+mn-cs"/>
                 </a:endParaRPr>
@@ -8900,7 +8961,7 @@
                   <a:effectLst/>
                   <a:uLnTx/>
                   <a:uFillTx/>
-                  <a:latin typeface="Calibri"/>
+                  <a:latin typeface="+mj-lt"/>
                   <a:ea typeface="+mn-ea"/>
                   <a:cs typeface="+mn-cs"/>
                 </a:endParaRPr>
@@ -8972,7 +9033,7 @@
                 <a:effectLst/>
                 <a:uLnTx/>
                 <a:uFillTx/>
-                <a:latin typeface="Arial" pitchFamily="34" charset="0"/>
+                <a:latin typeface="+mj-lt"/>
                 <a:ea typeface="HG明朝E" panose="02020909000000000000" pitchFamily="17" charset="-128"/>
                 <a:cs typeface="Arial" pitchFamily="34" charset="0"/>
               </a:rPr>
@@ -8988,7 +9049,7 @@
               <a:effectLst/>
               <a:uLnTx/>
               <a:uFillTx/>
-              <a:latin typeface="Arial" pitchFamily="34" charset="0"/>
+              <a:latin typeface="+mj-lt"/>
               <a:ea typeface="HG明朝E" panose="02020909000000000000" pitchFamily="17" charset="-128"/>
               <a:cs typeface="Arial" pitchFamily="34" charset="0"/>
             </a:endParaRPr>
@@ -9046,6 +9107,7 @@
               <a:solidFill>
                 <a:prstClr val="black"/>
               </a:solidFill>
+              <a:latin typeface="+mj-lt"/>
               <a:ea typeface="HG明朝E" panose="02020909000000000000" pitchFamily="17" charset="-128"/>
               <a:cs typeface="Arial" pitchFamily="34" charset="0"/>
             </a:endParaRPr>
@@ -9115,7 +9177,7 @@
                 <a:effectLst/>
                 <a:uLnTx/>
                 <a:uFillTx/>
-                <a:latin typeface="Arial" pitchFamily="34" charset="0"/>
+                <a:latin typeface="+mj-lt"/>
                 <a:ea typeface="HG明朝E" panose="02020909000000000000" pitchFamily="17" charset="-128"/>
                 <a:cs typeface="Arial" pitchFamily="34" charset="0"/>
               </a:rPr>
@@ -9131,7 +9193,7 @@
               <a:effectLst/>
               <a:uLnTx/>
               <a:uFillTx/>
-              <a:latin typeface="Arial" pitchFamily="34" charset="0"/>
+              <a:latin typeface="+mj-lt"/>
               <a:ea typeface="HG明朝E" panose="02020909000000000000" pitchFamily="17" charset="-128"/>
               <a:cs typeface="Arial" pitchFamily="34" charset="0"/>
             </a:endParaRPr>
@@ -9193,19 +9255,21 @@
               <a:defRPr/>
             </a:pPr>
             <a:r>
-              <a:rPr lang="en-US" altLang="ja-JP" sz="800" kern="0" smtClean="0">
+              <a:rPr lang="en-US" altLang="ja-JP" sz="800" kern="0" dirty="0" smtClean="0">
                 <a:solidFill>
                   <a:sysClr val="windowText" lastClr="000000"/>
                 </a:solidFill>
+                <a:latin typeface="+mj-lt"/>
                 <a:ea typeface="HG明朝E" panose="02020909000000000000" pitchFamily="17" charset="-128"/>
                 <a:cs typeface="Arial" pitchFamily="34" charset="0"/>
               </a:rPr>
-              <a:t>Digital Twiin</a:t>
-            </a:r>
-            <a:endParaRPr lang="en-US" altLang="ja-JP" sz="800" kern="0">
+              <a:t>Proxy Thing</a:t>
+            </a:r>
+            <a:endParaRPr lang="en-US" altLang="ja-JP" sz="800" kern="0" dirty="0">
               <a:solidFill>
                 <a:sysClr val="windowText" lastClr="000000"/>
               </a:solidFill>
+              <a:latin typeface="+mj-lt"/>
               <a:ea typeface="HG明朝E" panose="02020909000000000000" pitchFamily="17" charset="-128"/>
               <a:cs typeface="Arial" pitchFamily="34" charset="0"/>
             </a:endParaRPr>
@@ -9221,6 +9285,68 @@
         <p:spPr bwMode="auto">
           <a:xfrm>
             <a:off x="2077451" y="1580353"/>
+            <a:ext cx="955216" cy="180000"/>
+          </a:xfrm>
+          <a:prstGeom prst="verticalScroll">
+            <a:avLst/>
+          </a:prstGeom>
+          <a:solidFill>
+            <a:sysClr val="window" lastClr="FFFFFF"/>
+          </a:solidFill>
+          <a:ln w="6350" cap="flat" cmpd="sng" algn="ctr">
+            <a:solidFill>
+              <a:sysClr val="windowText" lastClr="000000"/>
+            </a:solidFill>
+            <a:prstDash val="sysDash"/>
+            <a:round/>
+            <a:headEnd type="none" w="med" len="med"/>
+            <a:tailEnd type="none" w="med" len="med"/>
+          </a:ln>
+          <a:effectLst/>
+          <a:extLst/>
+        </p:spPr>
+        <p:txBody>
+          <a:bodyPr vert="horz" wrap="none" lIns="91440" tIns="45720" rIns="91440" bIns="45720" numCol="1" rtlCol="0" anchor="ctr" anchorCtr="0" compatLnSpc="1">
+            <a:prstTxWarp prst="textNoShape">
+              <a:avLst/>
+            </a:prstTxWarp>
+          </a:bodyPr>
+          <a:lstStyle/>
+          <a:p>
+            <a:pPr lvl="0" algn="ctr" fontAlgn="ctr">
+              <a:defRPr/>
+            </a:pPr>
+            <a:r>
+              <a:rPr lang="en-US" altLang="ja-JP" sz="800" kern="0" dirty="0" smtClean="0">
+                <a:solidFill>
+                  <a:sysClr val="windowText" lastClr="000000"/>
+                </a:solidFill>
+                <a:latin typeface="+mj-lt"/>
+                <a:ea typeface="HG明朝E" panose="02020909000000000000" pitchFamily="17" charset="-128"/>
+                <a:cs typeface="Arial" pitchFamily="34" charset="0"/>
+              </a:rPr>
+              <a:t>Control Agent</a:t>
+            </a:r>
+            <a:endParaRPr lang="en-US" altLang="ja-JP" sz="800" kern="0" dirty="0">
+              <a:solidFill>
+                <a:sysClr val="windowText" lastClr="000000"/>
+              </a:solidFill>
+              <a:latin typeface="+mj-lt"/>
+              <a:ea typeface="HG明朝E" panose="02020909000000000000" pitchFamily="17" charset="-128"/>
+              <a:cs typeface="Arial" pitchFamily="34" charset="0"/>
+            </a:endParaRPr>
+          </a:p>
+        </p:txBody>
+      </p:sp>
+      <p:sp>
+        <p:nvSpPr>
+          <p:cNvPr id="89" name="縦巻き 49"/>
+          <p:cNvSpPr/>
+          <p:nvPr/>
+        </p:nvSpPr>
+        <p:spPr bwMode="auto">
+          <a:xfrm>
+            <a:off x="2077451" y="1368840"/>
             <a:ext cx="955216" cy="180000"/>
           </a:xfrm>
           <a:prstGeom prst="verticalScroll">
@@ -9267,111 +9393,6 @@
               <a:defRPr/>
             </a:pPr>
             <a:r>
-              <a:rPr kumimoji="0" lang="en-US" altLang="ja-JP" sz="800" b="0" i="0" u="none" strike="noStrike" kern="0" cap="none" spc="0" normalizeH="0" baseline="0" smtClean="0">
-                <a:ln>
-                  <a:noFill/>
-                </a:ln>
-                <a:solidFill>
-                  <a:sysClr val="windowText" lastClr="000000"/>
-                </a:solidFill>
-                <a:effectLst/>
-                <a:uLnTx/>
-                <a:uFillTx/>
-                <a:latin typeface="Arial" pitchFamily="34" charset="0"/>
-                <a:ea typeface="HG明朝E" panose="02020909000000000000" pitchFamily="17" charset="-128"/>
-                <a:cs typeface="Arial" pitchFamily="34" charset="0"/>
-              </a:rPr>
-              <a:t>Orchestr.</a:t>
-            </a:r>
-            <a:r>
-              <a:rPr kumimoji="0" lang="en-US" altLang="ja-JP" sz="800" b="0" i="0" u="none" strike="noStrike" kern="0" cap="none" spc="0" normalizeH="0" smtClean="0">
-                <a:ln>
-                  <a:noFill/>
-                </a:ln>
-                <a:solidFill>
-                  <a:sysClr val="windowText" lastClr="000000"/>
-                </a:solidFill>
-                <a:effectLst/>
-                <a:uLnTx/>
-                <a:uFillTx/>
-                <a:latin typeface="Arial" pitchFamily="34" charset="0"/>
-                <a:ea typeface="HG明朝E" panose="02020909000000000000" pitchFamily="17" charset="-128"/>
-                <a:cs typeface="Arial" pitchFamily="34" charset="0"/>
-              </a:rPr>
-              <a:t> Client</a:t>
-            </a:r>
-            <a:endParaRPr kumimoji="0" lang="en-US" altLang="ja-JP" sz="800" b="0" i="0" u="none" strike="noStrike" kern="0" cap="none" spc="0" normalizeH="0" baseline="0">
-              <a:ln>
-                <a:noFill/>
-              </a:ln>
-              <a:solidFill>
-                <a:sysClr val="windowText" lastClr="000000"/>
-              </a:solidFill>
-              <a:effectLst/>
-              <a:uLnTx/>
-              <a:uFillTx/>
-              <a:latin typeface="Arial" pitchFamily="34" charset="0"/>
-              <a:ea typeface="HG明朝E" panose="02020909000000000000" pitchFamily="17" charset="-128"/>
-              <a:cs typeface="Arial" pitchFamily="34" charset="0"/>
-            </a:endParaRPr>
-          </a:p>
-        </p:txBody>
-      </p:sp>
-      <p:sp>
-        <p:nvSpPr>
-          <p:cNvPr id="89" name="縦巻き 49"/>
-          <p:cNvSpPr/>
-          <p:nvPr/>
-        </p:nvSpPr>
-        <p:spPr bwMode="auto">
-          <a:xfrm>
-            <a:off x="2077451" y="1368840"/>
-            <a:ext cx="955216" cy="180000"/>
-          </a:xfrm>
-          <a:prstGeom prst="verticalScroll">
-            <a:avLst/>
-          </a:prstGeom>
-          <a:solidFill>
-            <a:sysClr val="window" lastClr="FFFFFF"/>
-          </a:solidFill>
-          <a:ln w="6350" cap="flat" cmpd="sng" algn="ctr">
-            <a:solidFill>
-              <a:sysClr val="windowText" lastClr="000000"/>
-            </a:solidFill>
-            <a:prstDash val="sysDash"/>
-            <a:round/>
-            <a:headEnd type="none" w="med" len="med"/>
-            <a:tailEnd type="none" w="med" len="med"/>
-          </a:ln>
-          <a:effectLst/>
-          <a:extLst/>
-        </p:spPr>
-        <p:txBody>
-          <a:bodyPr vert="horz" wrap="none" lIns="91440" tIns="45720" rIns="91440" bIns="45720" numCol="1" rtlCol="0" anchor="ctr" anchorCtr="0" compatLnSpc="1">
-            <a:prstTxWarp prst="textNoShape">
-              <a:avLst/>
-            </a:prstTxWarp>
-          </a:bodyPr>
-          <a:lstStyle/>
-          <a:p>
-            <a:pPr marL="0" marR="0" lvl="0" indent="0" algn="ctr" defTabSz="914400" eaLnBrk="1" fontAlgn="ctr" latinLnBrk="0" hangingPunct="1">
-              <a:lnSpc>
-                <a:spcPct val="100000"/>
-              </a:lnSpc>
-              <a:spcBef>
-                <a:spcPts val="0"/>
-              </a:spcBef>
-              <a:spcAft>
-                <a:spcPts val="0"/>
-              </a:spcAft>
-              <a:buClrTx/>
-              <a:buSzTx/>
-              <a:buFontTx/>
-              <a:buNone/>
-              <a:tabLst/>
-              <a:defRPr/>
-            </a:pPr>
-            <a:r>
               <a:rPr kumimoji="0" lang="en-US" altLang="ja-JP" sz="800" b="0" i="0" u="none" strike="noStrike" kern="0" cap="none" spc="0" normalizeH="0" baseline="0" dirty="0" smtClean="0">
                 <a:ln>
                   <a:noFill/>
@@ -9382,7 +9403,7 @@
                 <a:effectLst/>
                 <a:uLnTx/>
                 <a:uFillTx/>
-                <a:latin typeface="Arial" pitchFamily="34" charset="0"/>
+                <a:latin typeface="+mj-lt"/>
                 <a:ea typeface="HG明朝E" panose="02020909000000000000" pitchFamily="17" charset="-128"/>
                 <a:cs typeface="Arial" pitchFamily="34" charset="0"/>
               </a:rPr>
@@ -9398,7 +9419,7 @@
               <a:effectLst/>
               <a:uLnTx/>
               <a:uFillTx/>
-              <a:latin typeface="Arial" pitchFamily="34" charset="0"/>
+              <a:latin typeface="+mj-lt"/>
               <a:ea typeface="HG明朝E" panose="02020909000000000000" pitchFamily="17" charset="-128"/>
               <a:cs typeface="Arial" pitchFamily="34" charset="0"/>
             </a:endParaRPr>
@@ -9484,7 +9505,7 @@
                 <a:effectLst/>
                 <a:uLnTx/>
                 <a:uFillTx/>
-                <a:latin typeface="Arial" pitchFamily="34" charset="0"/>
+                <a:latin typeface="+mj-lt"/>
                 <a:ea typeface="HG明朝E" panose="02020909000000000000" pitchFamily="17" charset="-128"/>
                 <a:cs typeface="Arial" pitchFamily="34" charset="0"/>
               </a:endParaRPr>
@@ -9559,7 +9580,7 @@
                   <a:effectLst/>
                   <a:uLnTx/>
                   <a:uFillTx/>
-                  <a:latin typeface="Calibri"/>
+                  <a:latin typeface="+mj-lt"/>
                   <a:ea typeface="+mn-ea"/>
                   <a:cs typeface="+mn-cs"/>
                 </a:endParaRPr>
@@ -9620,7 +9641,7 @@
                   <a:effectLst/>
                   <a:uLnTx/>
                   <a:uFillTx/>
-                  <a:latin typeface="Calibri"/>
+                  <a:latin typeface="+mj-lt"/>
                   <a:ea typeface="+mn-ea"/>
                   <a:cs typeface="+mn-cs"/>
                 </a:endParaRPr>
@@ -9681,7 +9702,7 @@
                   <a:effectLst/>
                   <a:uLnTx/>
                   <a:uFillTx/>
-                  <a:latin typeface="Calibri"/>
+                  <a:latin typeface="+mj-lt"/>
                   <a:ea typeface="+mn-ea"/>
                   <a:cs typeface="+mn-cs"/>
                 </a:endParaRPr>
@@ -9742,7 +9763,7 @@
                   <a:effectLst/>
                   <a:uLnTx/>
                   <a:uFillTx/>
-                  <a:latin typeface="Calibri"/>
+                  <a:latin typeface="+mj-lt"/>
                   <a:ea typeface="+mn-ea"/>
                   <a:cs typeface="+mn-cs"/>
                 </a:endParaRPr>
@@ -9782,7 +9803,7 @@
           <a:effectLst/>
           <a:extLst>
             <a:ext uri="{AF507438-7753-43E0-B8FC-AC1667EBCBE1}">
-              <a14:hiddenEffects xmlns:a14="http://schemas.microsoft.com/office/drawing/2010/main" xmlns="">
+              <a14:hiddenEffects xmlns="" xmlns:a14="http://schemas.microsoft.com/office/drawing/2010/main">
                 <a:effectLst>
                   <a:outerShdw blurRad="63500" dist="35921" dir="2700000" algn="ctr" rotWithShape="0">
                     <a:schemeClr val="bg2"/>
@@ -9825,7 +9846,7 @@
           <a:effectLst/>
           <a:extLst>
             <a:ext uri="{AF507438-7753-43E0-B8FC-AC1667EBCBE1}">
-              <a14:hiddenEffects xmlns:a14="http://schemas.microsoft.com/office/drawing/2010/main" xmlns="">
+              <a14:hiddenEffects xmlns="" xmlns:a14="http://schemas.microsoft.com/office/drawing/2010/main">
                 <a:effectLst>
                   <a:outerShdw blurRad="63500" dist="35921" dir="2700000" algn="ctr" rotWithShape="0">
                     <a:schemeClr val="bg2"/>
@@ -9906,7 +9927,7 @@
                 <a:effectLst/>
                 <a:uLnTx/>
                 <a:uFillTx/>
-                <a:latin typeface="Arial" pitchFamily="34" charset="0"/>
+                <a:latin typeface="+mj-lt"/>
                 <a:ea typeface="HG明朝E" panose="02020909000000000000" pitchFamily="17" charset="-128"/>
                 <a:cs typeface="Arial" pitchFamily="34" charset="0"/>
               </a:rPr>
@@ -9927,7 +9948,7 @@
           <a:blip r:embed="rId5" cstate="print">
             <a:extLst>
               <a:ext uri="{28A0092B-C50C-407E-A947-70E740481C1C}">
-                <a14:useLocalDpi xmlns:a14="http://schemas.microsoft.com/office/drawing/2010/main" xmlns="" val="0"/>
+                <a14:useLocalDpi xmlns="" xmlns:a14="http://schemas.microsoft.com/office/drawing/2010/main" val="0"/>
               </a:ext>
             </a:extLst>
           </a:blip>
@@ -9968,16 +9989,22 @@
           <a:lstStyle/>
           <a:p>
             <a:r>
-              <a:rPr lang="en-US" sz="1600" b="1" dirty="0" smtClean="0"/>
+              <a:rPr lang="en-US" sz="1600" b="1" dirty="0" smtClean="0">
+                <a:latin typeface="+mj-lt"/>
+              </a:rPr>
               <a:t>Seamless</a:t>
             </a:r>
           </a:p>
           <a:p>
             <a:r>
-              <a:rPr lang="en-US" sz="1600" b="1" dirty="0" smtClean="0"/>
+              <a:rPr lang="en-US" sz="1600" b="1" dirty="0" smtClean="0">
+                <a:latin typeface="+mj-lt"/>
+              </a:rPr>
               <a:t>Web Integration</a:t>
             </a:r>
-            <a:endParaRPr lang="en-US" sz="1600" b="1" dirty="0"/>
+            <a:endParaRPr lang="en-US" sz="1600" b="1" dirty="0">
+              <a:latin typeface="+mj-lt"/>
+            </a:endParaRPr>
           </a:p>
         </p:txBody>
       </p:sp>
@@ -10024,7 +10051,7 @@
                 <a:solidFill>
                   <a:schemeClr val="bg1"/>
                 </a:solidFill>
-                <a:latin typeface="Arial" pitchFamily="34" charset="0"/>
+                <a:latin typeface="+mj-lt"/>
                 <a:ea typeface="HG明朝E" panose="02020909000000000000" pitchFamily="17" charset="-128"/>
                 <a:cs typeface="Arial" pitchFamily="34" charset="0"/>
               </a:rPr>
@@ -10034,7 +10061,7 @@
               <a:solidFill>
                 <a:schemeClr val="bg1"/>
               </a:solidFill>
-              <a:latin typeface="Arial" pitchFamily="34" charset="0"/>
+              <a:latin typeface="+mj-lt"/>
               <a:ea typeface="HG明朝E" panose="02020909000000000000" pitchFamily="17" charset="-128"/>
               <a:cs typeface="Arial" pitchFamily="34" charset="0"/>
             </a:endParaRPr>
@@ -10084,7 +10111,7 @@
                 <a:solidFill>
                   <a:schemeClr val="bg1"/>
                 </a:solidFill>
-                <a:latin typeface="Arial" pitchFamily="34" charset="0"/>
+                <a:latin typeface="+mj-lt"/>
                 <a:ea typeface="HG明朝E" panose="02020909000000000000" pitchFamily="17" charset="-128"/>
                 <a:cs typeface="Arial" pitchFamily="34" charset="0"/>
               </a:rPr>
@@ -10094,7 +10121,7 @@
               <a:solidFill>
                 <a:schemeClr val="bg1"/>
               </a:solidFill>
-              <a:latin typeface="Arial" pitchFamily="34" charset="0"/>
+              <a:latin typeface="+mj-lt"/>
               <a:ea typeface="HG明朝E" panose="02020909000000000000" pitchFamily="17" charset="-128"/>
               <a:cs typeface="Arial" pitchFamily="34" charset="0"/>
             </a:endParaRPr>
@@ -10143,14 +10170,14 @@
             </a:pPr>
             <a:r>
               <a:rPr lang="en-US" altLang="ja-JP" sz="800" kern="0" dirty="0" smtClean="0">
-                <a:latin typeface="Arial" pitchFamily="34" charset="0"/>
+                <a:latin typeface="+mj-lt"/>
                 <a:ea typeface="HG明朝E" panose="02020909000000000000" pitchFamily="17" charset="-128"/>
                 <a:cs typeface="Arial" pitchFamily="34" charset="0"/>
               </a:rPr>
               <a:t>App Script</a:t>
             </a:r>
             <a:endParaRPr lang="en-US" altLang="ja-JP" sz="800" kern="0" dirty="0">
-              <a:latin typeface="Arial" pitchFamily="34" charset="0"/>
+              <a:latin typeface="+mj-lt"/>
               <a:ea typeface="HG明朝E" panose="02020909000000000000" pitchFamily="17" charset="-128"/>
               <a:cs typeface="Arial" pitchFamily="34" charset="0"/>
             </a:endParaRPr>
@@ -10200,7 +10227,7 @@
                 <a:solidFill>
                   <a:schemeClr val="bg1"/>
                 </a:solidFill>
-                <a:latin typeface="Arial" pitchFamily="34" charset="0"/>
+                <a:latin typeface="+mj-lt"/>
                 <a:ea typeface="HG明朝E" panose="02020909000000000000" pitchFamily="17" charset="-128"/>
                 <a:cs typeface="Arial" pitchFamily="34" charset="0"/>
               </a:rPr>
@@ -10210,7 +10237,7 @@
               <a:solidFill>
                 <a:schemeClr val="bg1"/>
               </a:solidFill>
-              <a:latin typeface="Arial" pitchFamily="34" charset="0"/>
+              <a:latin typeface="+mj-lt"/>
               <a:ea typeface="HG明朝E" panose="02020909000000000000" pitchFamily="17" charset="-128"/>
               <a:cs typeface="Arial" pitchFamily="34" charset="0"/>
             </a:endParaRPr>
@@ -10259,7 +10286,9 @@
           <a:lstStyle/>
           <a:p>
             <a:pPr algn="ctr"/>
-            <a:endParaRPr lang="en-US" sz="4400"/>
+            <a:endParaRPr lang="en-US" sz="4400">
+              <a:latin typeface="+mj-lt"/>
+            </a:endParaRPr>
           </a:p>
         </p:txBody>
       </p:sp>
@@ -10305,7 +10334,9 @@
           <a:lstStyle/>
           <a:p>
             <a:pPr algn="ctr"/>
-            <a:endParaRPr lang="en-US" sz="4400"/>
+            <a:endParaRPr lang="en-US" sz="4400">
+              <a:latin typeface="+mj-lt"/>
+            </a:endParaRPr>
           </a:p>
         </p:txBody>
       </p:sp>
@@ -10321,7 +10352,7 @@
           <a:blip r:embed="rId6" cstate="print">
             <a:extLst>
               <a:ext uri="{BEBA8EAE-BF5A-486C-A8C5-ECC9F3942E4B}">
-                <a14:imgProps xmlns="" xmlns:lc="http://schemas.openxmlformats.org/drawingml/2006/lockedCanvas" xmlns:a14="http://schemas.microsoft.com/office/drawing/2010/main">
+                <a14:imgProps xmlns:a14="http://schemas.microsoft.com/office/drawing/2010/main" xmlns:lc="http://schemas.openxmlformats.org/drawingml/2006/lockedCanvas" xmlns="">
                   <a14:imgLayer r:embed="rId7">
                     <a14:imgEffect>
                       <a14:backgroundRemoval t="10000" b="90000" l="10000" r="90000">
@@ -10367,7 +10398,7 @@
                 </a14:imgProps>
               </a:ext>
               <a:ext uri="{28A0092B-C50C-407E-A947-70E740481C1C}">
-                <a14:useLocalDpi xmlns="" xmlns:lc="http://schemas.openxmlformats.org/drawingml/2006/lockedCanvas" xmlns:a14="http://schemas.microsoft.com/office/drawing/2010/main" val="0"/>
+                <a14:useLocalDpi xmlns:a14="http://schemas.microsoft.com/office/drawing/2010/main" xmlns:lc="http://schemas.openxmlformats.org/drawingml/2006/lockedCanvas" xmlns="" val="0"/>
               </a:ext>
             </a:extLst>
           </a:blip>
@@ -10387,7 +10418,7 @@
           <a:noFill/>
           <a:extLst>
             <a:ext uri="{909E8E84-426E-40DD-AFC4-6F175D3DCCD1}">
-              <a14:hiddenFill xmlns="" xmlns:lc="http://schemas.openxmlformats.org/drawingml/2006/lockedCanvas" xmlns:a14="http://schemas.microsoft.com/office/drawing/2010/main">
+              <a14:hiddenFill xmlns:a14="http://schemas.microsoft.com/office/drawing/2010/main" xmlns:lc="http://schemas.openxmlformats.org/drawingml/2006/lockedCanvas" xmlns="">
                 <a:solidFill>
                   <a:srgbClr val="FFFFFF"/>
                 </a:solidFill>
@@ -10420,17 +10451,25 @@
           <a:p>
             <a:pPr algn="ctr"/>
             <a:r>
-              <a:rPr lang="en-US" sz="1600" b="1" dirty="0" smtClean="0"/>
+              <a:rPr lang="en-US" sz="1600" b="1" dirty="0" smtClean="0">
+                <a:latin typeface="+mj-lt"/>
+              </a:rPr>
               <a:t>Remote Access</a:t>
             </a:r>
             <a:br>
-              <a:rPr lang="en-US" sz="1600" b="1" dirty="0" smtClean="0"/>
+              <a:rPr lang="en-US" sz="1600" b="1" dirty="0" smtClean="0">
+                <a:latin typeface="+mj-lt"/>
+              </a:rPr>
             </a:br>
             <a:r>
-              <a:rPr lang="en-US" sz="1600" b="1" dirty="0" smtClean="0"/>
+              <a:rPr lang="en-US" sz="1600" b="1" dirty="0" smtClean="0">
+                <a:latin typeface="+mj-lt"/>
+              </a:rPr>
               <a:t>and Synchronization</a:t>
             </a:r>
-            <a:endParaRPr lang="en-US" sz="1600" b="1" dirty="0"/>
+            <a:endParaRPr lang="en-US" sz="1600" b="1" dirty="0">
+              <a:latin typeface="+mj-lt"/>
+            </a:endParaRPr>
           </a:p>
         </p:txBody>
       </p:sp>
@@ -10458,17 +10497,25 @@
           <a:p>
             <a:pPr algn="ctr"/>
             <a:r>
-              <a:rPr lang="en-US" sz="1600" b="1" dirty="0" smtClean="0"/>
+              <a:rPr lang="en-US" sz="1600" b="1" dirty="0" smtClean="0">
+                <a:latin typeface="+mj-lt"/>
+              </a:rPr>
               <a:t>Integration and</a:t>
             </a:r>
             <a:br>
-              <a:rPr lang="en-US" sz="1600" b="1" dirty="0" smtClean="0"/>
+              <a:rPr lang="en-US" sz="1600" b="1" dirty="0" smtClean="0">
+                <a:latin typeface="+mj-lt"/>
+              </a:rPr>
             </a:br>
             <a:r>
-              <a:rPr lang="en-US" sz="1600" b="1" dirty="0" smtClean="0"/>
+              <a:rPr lang="en-US" sz="1600" b="1" dirty="0" smtClean="0">
+                <a:latin typeface="+mj-lt"/>
+              </a:rPr>
               <a:t>Orchestration</a:t>
             </a:r>
-            <a:endParaRPr lang="en-US" sz="1600" b="1" dirty="0"/>
+            <a:endParaRPr lang="en-US" sz="1600" b="1" dirty="0">
+              <a:latin typeface="+mj-lt"/>
+            </a:endParaRPr>
           </a:p>
         </p:txBody>
       </p:sp>
@@ -10514,7 +10561,9 @@
           <a:lstStyle/>
           <a:p>
             <a:pPr algn="ctr"/>
-            <a:endParaRPr lang="en-US" sz="4400"/>
+            <a:endParaRPr lang="en-US" sz="4400">
+              <a:latin typeface="+mj-lt"/>
+            </a:endParaRPr>
           </a:p>
         </p:txBody>
       </p:sp>
@@ -14982,7 +15031,7 @@
           <a:blip r:embed="rId3" cstate="print">
             <a:extLst>
               <a:ext uri="{28A0092B-C50C-407E-A947-70E740481C1C}">
-                <a14:useLocalDpi xmlns:a14="http://schemas.microsoft.com/office/drawing/2010/main" xmlns="" val="0"/>
+                <a14:useLocalDpi xmlns="" xmlns:a14="http://schemas.microsoft.com/office/drawing/2010/main" val="0"/>
               </a:ext>
             </a:extLst>
           </a:blip>
@@ -17662,7 +17711,7 @@
           <a:blip r:embed="rId3" cstate="print">
             <a:extLst>
               <a:ext uri="{28A0092B-C50C-407E-A947-70E740481C1C}">
-                <a14:useLocalDpi xmlns:a14="http://schemas.microsoft.com/office/drawing/2010/main" xmlns="" val="0"/>
+                <a14:useLocalDpi xmlns="" xmlns:a14="http://schemas.microsoft.com/office/drawing/2010/main" val="0"/>
               </a:ext>
             </a:extLst>
           </a:blip>
@@ -21268,7 +21317,7 @@
           <a:blip r:embed="rId3" cstate="print">
             <a:extLst>
               <a:ext uri="{28A0092B-C50C-407E-A947-70E740481C1C}">
-                <a14:useLocalDpi xmlns:a14="http://schemas.microsoft.com/office/drawing/2010/main" xmlns="" val="0"/>
+                <a14:useLocalDpi xmlns="" xmlns:a14="http://schemas.microsoft.com/office/drawing/2010/main" val="0"/>
               </a:ext>
             </a:extLst>
           </a:blip>
@@ -45604,7 +45653,7 @@
           <a:blip r:embed="rId4" cstate="print">
             <a:extLst>
               <a:ext uri="{BEBA8EAE-BF5A-486C-A8C5-ECC9F3942E4B}">
-                <a14:imgProps xmlns="" xmlns:a14="http://schemas.microsoft.com/office/drawing/2010/main">
+                <a14:imgProps xmlns:a14="http://schemas.microsoft.com/office/drawing/2010/main" xmlns="">
                   <a14:imgLayer r:embed="rId8">
                     <a14:imgEffect>
                       <a14:backgroundRemoval t="10000" b="90000" l="10000" r="90000"/>

</xml_diff>